<commit_message>
RFMC frontend DAC architecture added
</commit_message>
<xml_diff>
--- a/Documents/PPT/RFSoC RF FrontEnd_v1_00.pptx
+++ b/Documents/PPT/RFSoC RF FrontEnd_v1_00.pptx
@@ -265,7 +265,7 @@
           <a:p>
             <a:fld id="{83D81050-B5AC-4287-9BFE-8FA365E2B7CE}" type="datetimeFigureOut">
               <a:rPr lang="ko-KR" altLang="en-US" smtClean="0"/>
-              <a:t>2023-11-22</a:t>
+              <a:t>2023-11-29</a:t>
             </a:fld>
             <a:endParaRPr lang="ko-KR" altLang="en-US"/>
           </a:p>
@@ -463,7 +463,7 @@
           <a:p>
             <a:fld id="{83D81050-B5AC-4287-9BFE-8FA365E2B7CE}" type="datetimeFigureOut">
               <a:rPr lang="ko-KR" altLang="en-US" smtClean="0"/>
-              <a:t>2023-11-22</a:t>
+              <a:t>2023-11-29</a:t>
             </a:fld>
             <a:endParaRPr lang="ko-KR" altLang="en-US"/>
           </a:p>
@@ -671,7 +671,7 @@
           <a:p>
             <a:fld id="{83D81050-B5AC-4287-9BFE-8FA365E2B7CE}" type="datetimeFigureOut">
               <a:rPr lang="ko-KR" altLang="en-US" smtClean="0"/>
-              <a:t>2023-11-22</a:t>
+              <a:t>2023-11-29</a:t>
             </a:fld>
             <a:endParaRPr lang="ko-KR" altLang="en-US"/>
           </a:p>
@@ -869,7 +869,7 @@
           <a:p>
             <a:fld id="{83D81050-B5AC-4287-9BFE-8FA365E2B7CE}" type="datetimeFigureOut">
               <a:rPr lang="ko-KR" altLang="en-US" smtClean="0"/>
-              <a:t>2023-11-22</a:t>
+              <a:t>2023-11-29</a:t>
             </a:fld>
             <a:endParaRPr lang="ko-KR" altLang="en-US"/>
           </a:p>
@@ -1144,7 +1144,7 @@
           <a:p>
             <a:fld id="{83D81050-B5AC-4287-9BFE-8FA365E2B7CE}" type="datetimeFigureOut">
               <a:rPr lang="ko-KR" altLang="en-US" smtClean="0"/>
-              <a:t>2023-11-22</a:t>
+              <a:t>2023-11-29</a:t>
             </a:fld>
             <a:endParaRPr lang="ko-KR" altLang="en-US"/>
           </a:p>
@@ -1409,7 +1409,7 @@
           <a:p>
             <a:fld id="{83D81050-B5AC-4287-9BFE-8FA365E2B7CE}" type="datetimeFigureOut">
               <a:rPr lang="ko-KR" altLang="en-US" smtClean="0"/>
-              <a:t>2023-11-22</a:t>
+              <a:t>2023-11-29</a:t>
             </a:fld>
             <a:endParaRPr lang="ko-KR" altLang="en-US"/>
           </a:p>
@@ -1821,7 +1821,7 @@
           <a:p>
             <a:fld id="{83D81050-B5AC-4287-9BFE-8FA365E2B7CE}" type="datetimeFigureOut">
               <a:rPr lang="ko-KR" altLang="en-US" smtClean="0"/>
-              <a:t>2023-11-22</a:t>
+              <a:t>2023-11-29</a:t>
             </a:fld>
             <a:endParaRPr lang="ko-KR" altLang="en-US"/>
           </a:p>
@@ -1962,7 +1962,7 @@
           <a:p>
             <a:fld id="{83D81050-B5AC-4287-9BFE-8FA365E2B7CE}" type="datetimeFigureOut">
               <a:rPr lang="ko-KR" altLang="en-US" smtClean="0"/>
-              <a:t>2023-11-22</a:t>
+              <a:t>2023-11-29</a:t>
             </a:fld>
             <a:endParaRPr lang="ko-KR" altLang="en-US"/>
           </a:p>
@@ -2075,7 +2075,7 @@
           <a:p>
             <a:fld id="{83D81050-B5AC-4287-9BFE-8FA365E2B7CE}" type="datetimeFigureOut">
               <a:rPr lang="ko-KR" altLang="en-US" smtClean="0"/>
-              <a:t>2023-11-22</a:t>
+              <a:t>2023-11-29</a:t>
             </a:fld>
             <a:endParaRPr lang="ko-KR" altLang="en-US"/>
           </a:p>
@@ -2386,7 +2386,7 @@
           <a:p>
             <a:fld id="{83D81050-B5AC-4287-9BFE-8FA365E2B7CE}" type="datetimeFigureOut">
               <a:rPr lang="ko-KR" altLang="en-US" smtClean="0"/>
-              <a:t>2023-11-22</a:t>
+              <a:t>2023-11-29</a:t>
             </a:fld>
             <a:endParaRPr lang="ko-KR" altLang="en-US"/>
           </a:p>
@@ -2674,7 +2674,7 @@
           <a:p>
             <a:fld id="{83D81050-B5AC-4287-9BFE-8FA365E2B7CE}" type="datetimeFigureOut">
               <a:rPr lang="ko-KR" altLang="en-US" smtClean="0"/>
-              <a:t>2023-11-22</a:t>
+              <a:t>2023-11-29</a:t>
             </a:fld>
             <a:endParaRPr lang="ko-KR" altLang="en-US"/>
           </a:p>
@@ -2915,7 +2915,7 @@
           <a:p>
             <a:fld id="{83D81050-B5AC-4287-9BFE-8FA365E2B7CE}" type="datetimeFigureOut">
               <a:rPr lang="ko-KR" altLang="en-US" smtClean="0"/>
-              <a:t>2023-11-22</a:t>
+              <a:t>2023-11-29</a:t>
             </a:fld>
             <a:endParaRPr lang="ko-KR" altLang="en-US"/>
           </a:p>
@@ -5070,7 +5070,7 @@
         <p:spPr>
           <a:xfrm>
             <a:off x="4085112" y="5396983"/>
-            <a:ext cx="3586348" cy="1210583"/>
+            <a:ext cx="2511631" cy="1210583"/>
           </a:xfrm>
           <a:prstGeom prst="rect">
             <a:avLst/>
@@ -5391,6 +5391,64 @@
           </a:fontRef>
         </p:style>
       </p:cxnSp>
+      <p:sp>
+        <p:nvSpPr>
+          <p:cNvPr id="2" name="직사각형 1">
+            <a:extLst>
+              <a:ext uri="{FF2B5EF4-FFF2-40B4-BE49-F238E27FC236}">
+                <a16:creationId xmlns:a16="http://schemas.microsoft.com/office/drawing/2014/main" id="{C1AA2F78-550B-009B-BBCC-DF5465D87042}"/>
+              </a:ext>
+            </a:extLst>
+          </p:cNvPr>
+          <p:cNvSpPr/>
+          <p:nvPr/>
+        </p:nvSpPr>
+        <p:spPr>
+          <a:xfrm>
+            <a:off x="6703621" y="5396983"/>
+            <a:ext cx="1074716" cy="1210583"/>
+          </a:xfrm>
+          <a:prstGeom prst="rect">
+            <a:avLst/>
+          </a:prstGeom>
+          <a:solidFill>
+            <a:schemeClr val="accent3"/>
+          </a:solidFill>
+          <a:ln>
+            <a:solidFill>
+              <a:schemeClr val="tx1"/>
+            </a:solidFill>
+          </a:ln>
+        </p:spPr>
+        <p:style>
+          <a:lnRef idx="2">
+            <a:schemeClr val="accent1">
+              <a:shade val="15000"/>
+            </a:schemeClr>
+          </a:lnRef>
+          <a:fillRef idx="1">
+            <a:schemeClr val="accent1"/>
+          </a:fillRef>
+          <a:effectRef idx="0">
+            <a:schemeClr val="accent1"/>
+          </a:effectRef>
+          <a:fontRef idx="minor">
+            <a:schemeClr val="lt1"/>
+          </a:fontRef>
+        </p:style>
+        <p:txBody>
+          <a:bodyPr rtlCol="0" anchor="ctr"/>
+          <a:lstStyle/>
+          <a:p>
+            <a:pPr algn="ctr"/>
+            <a:r>
+              <a:rPr lang="en-US" altLang="ko-KR"/>
+              <a:t>PWR</a:t>
+            </a:r>
+            <a:endParaRPr lang="ko-KR" altLang="en-US"/>
+          </a:p>
+        </p:txBody>
+      </p:sp>
     </p:spTree>
     <p:extLst>
       <p:ext uri="{BB962C8B-B14F-4D97-AF65-F5344CB8AC3E}">
@@ -5435,7 +5493,7 @@
         </p:nvSpPr>
         <p:spPr>
           <a:xfrm rot="5400000">
-            <a:off x="7501904" y="4064514"/>
+            <a:off x="7585177" y="4064514"/>
             <a:ext cx="576488" cy="443603"/>
           </a:xfrm>
           <a:prstGeom prst="triangle">
@@ -5841,7 +5899,7 @@
         </p:nvGrpSpPr>
         <p:grpSpPr>
           <a:xfrm>
-            <a:off x="3637694" y="4149743"/>
+            <a:off x="3779704" y="4242212"/>
             <a:ext cx="621093" cy="621093"/>
             <a:chOff x="3310368" y="4369910"/>
             <a:chExt cx="621093" cy="621093"/>
@@ -6347,7 +6405,6 @@
           </p:cNvPr>
           <p:cNvCxnSpPr>
             <a:cxnSpLocks/>
-            <a:stCxn id="35" idx="1"/>
             <a:endCxn id="6" idx="3"/>
           </p:cNvCxnSpPr>
           <p:nvPr/>
@@ -6355,7 +6412,7 @@
         <p:spPr>
           <a:xfrm flipH="1">
             <a:off x="5687289" y="4283445"/>
-            <a:ext cx="266199" cy="0"/>
+            <a:ext cx="89624" cy="0"/>
           </a:xfrm>
           <a:prstGeom prst="line">
             <a:avLst/>
@@ -6381,47 +6438,6 @@
           </a:fontRef>
         </p:style>
       </p:cxnSp>
-      <p:cxnSp>
-        <p:nvCxnSpPr>
-          <p:cNvPr id="25" name="직선 연결선[R] 92">
-            <a:extLst>
-              <a:ext uri="{FF2B5EF4-FFF2-40B4-BE49-F238E27FC236}">
-                <a16:creationId xmlns:a16="http://schemas.microsoft.com/office/drawing/2014/main" id="{C54F9B86-01F0-8284-A1CA-14C73642D2A4}"/>
-              </a:ext>
-            </a:extLst>
-          </p:cNvPr>
-          <p:cNvCxnSpPr>
-            <a:cxnSpLocks/>
-            <a:stCxn id="4" idx="3"/>
-            <a:endCxn id="10" idx="3"/>
-          </p:cNvCxnSpPr>
-          <p:nvPr/>
-        </p:nvCxnSpPr>
-        <p:spPr>
-          <a:xfrm flipH="1" flipV="1">
-            <a:off x="7416317" y="4284057"/>
-            <a:ext cx="152030" cy="2259"/>
-          </a:xfrm>
-          <a:prstGeom prst="line">
-            <a:avLst/>
-          </a:prstGeom>
-          <a:ln w="25400"/>
-        </p:spPr>
-        <p:style>
-          <a:lnRef idx="1">
-            <a:schemeClr val="dk1"/>
-          </a:lnRef>
-          <a:fillRef idx="0">
-            <a:schemeClr val="dk1"/>
-          </a:fillRef>
-          <a:effectRef idx="0">
-            <a:schemeClr val="dk1"/>
-          </a:effectRef>
-          <a:fontRef idx="minor">
-            <a:schemeClr val="tx1"/>
-          </a:fontRef>
-        </p:style>
-      </p:cxnSp>
       <p:sp>
         <p:nvSpPr>
           <p:cNvPr id="26" name="TextBox 25">
@@ -6436,7 +6452,7 @@
         </p:nvSpPr>
         <p:spPr>
           <a:xfrm>
-            <a:off x="3606426" y="4783821"/>
+            <a:off x="3748436" y="4876290"/>
             <a:ext cx="683628" cy="492443"/>
           </a:xfrm>
           <a:prstGeom prst="rect">
@@ -6902,15 +6918,14 @@
           </p:cNvPr>
           <p:cNvCxnSpPr>
             <a:cxnSpLocks/>
-            <a:stCxn id="10" idx="1"/>
             <a:endCxn id="35" idx="3"/>
           </p:cNvCxnSpPr>
           <p:nvPr/>
         </p:nvCxnSpPr>
         <p:spPr>
-          <a:xfrm flipH="1" flipV="1">
+          <a:xfrm flipH="1">
             <a:off x="6574581" y="4283445"/>
-            <a:ext cx="220643" cy="612"/>
+            <a:ext cx="65932" cy="0"/>
           </a:xfrm>
           <a:prstGeom prst="line">
             <a:avLst/>
@@ -6954,7 +6969,7 @@
         </p:nvCxnSpPr>
         <p:spPr>
           <a:xfrm flipH="1" flipV="1">
-            <a:off x="3017360" y="4460289"/>
+            <a:off x="3159370" y="4552758"/>
             <a:ext cx="620334" cy="1"/>
           </a:xfrm>
           <a:prstGeom prst="line">
@@ -7084,7 +7099,7 @@
         </p:nvSpPr>
         <p:spPr>
           <a:xfrm>
-            <a:off x="2030476" y="3116677"/>
+            <a:off x="2172486" y="3209146"/>
             <a:ext cx="986884" cy="2687224"/>
           </a:xfrm>
           <a:prstGeom prst="rect">
@@ -7144,7 +7159,7 @@
         </p:nvSpPr>
         <p:spPr>
           <a:xfrm>
-            <a:off x="8163978" y="3898356"/>
+            <a:off x="8342047" y="3898356"/>
             <a:ext cx="1187839" cy="775919"/>
           </a:xfrm>
           <a:prstGeom prst="rect">
@@ -7443,14 +7458,329 @@
         <p:spPr>
           <a:xfrm>
             <a:off x="4854154" y="4817040"/>
-            <a:ext cx="3309824" cy="1253560"/>
+            <a:ext cx="3404620" cy="1253560"/>
           </a:xfrm>
           <a:prstGeom prst="bentConnector3">
             <a:avLst>
-              <a:gd name="adj1" fmla="val 6407"/>
+              <a:gd name="adj1" fmla="val 7102"/>
             </a:avLst>
           </a:prstGeom>
           <a:ln w="25400"/>
+        </p:spPr>
+        <p:style>
+          <a:lnRef idx="1">
+            <a:schemeClr val="dk1"/>
+          </a:lnRef>
+          <a:fillRef idx="0">
+            <a:schemeClr val="dk1"/>
+          </a:fillRef>
+          <a:effectRef idx="0">
+            <a:schemeClr val="dk1"/>
+          </a:effectRef>
+          <a:fontRef idx="minor">
+            <a:schemeClr val="tx1"/>
+          </a:fontRef>
+        </p:style>
+      </p:cxnSp>
+      <p:sp>
+        <p:nvSpPr>
+          <p:cNvPr id="52" name="직사각형 51">
+            <a:extLst>
+              <a:ext uri="{FF2B5EF4-FFF2-40B4-BE49-F238E27FC236}">
+                <a16:creationId xmlns:a16="http://schemas.microsoft.com/office/drawing/2014/main" id="{6FA0557C-F19F-27EF-8C92-0CAADD6C57DC}"/>
+              </a:ext>
+            </a:extLst>
+          </p:cNvPr>
+          <p:cNvSpPr/>
+          <p:nvPr/>
+        </p:nvSpPr>
+        <p:spPr>
+          <a:xfrm>
+            <a:off x="8258774" y="5682640"/>
+            <a:ext cx="1187839" cy="775919"/>
+          </a:xfrm>
+          <a:prstGeom prst="rect">
+            <a:avLst/>
+          </a:prstGeom>
+          <a:noFill/>
+          <a:ln w="25400"/>
+        </p:spPr>
+        <p:style>
+          <a:lnRef idx="2">
+            <a:schemeClr val="dk1">
+              <a:shade val="50000"/>
+            </a:schemeClr>
+          </a:lnRef>
+          <a:fillRef idx="1">
+            <a:schemeClr val="dk1"/>
+          </a:fillRef>
+          <a:effectRef idx="0">
+            <a:schemeClr val="dk1"/>
+          </a:effectRef>
+          <a:fontRef idx="minor">
+            <a:schemeClr val="lt1"/>
+          </a:fontRef>
+        </p:style>
+        <p:txBody>
+          <a:bodyPr rtlCol="0" anchor="ctr"/>
+          <a:lstStyle/>
+          <a:p>
+            <a:pPr algn="ctr"/>
+            <a:r>
+              <a:rPr kumimoji="1" lang="en-US" altLang="ko-Kore-KR">
+                <a:solidFill>
+                  <a:schemeClr val="tx1"/>
+                </a:solidFill>
+              </a:rPr>
+              <a:t>SMA </a:t>
+            </a:r>
+          </a:p>
+          <a:p>
+            <a:pPr algn="ctr"/>
+            <a:r>
+              <a:rPr kumimoji="1" lang="en-US" altLang="ko-Kore-KR">
+                <a:solidFill>
+                  <a:schemeClr val="tx1"/>
+                </a:solidFill>
+              </a:rPr>
+              <a:t>output</a:t>
+            </a:r>
+            <a:endParaRPr kumimoji="1" lang="ko-Kore-KR" altLang="en-US" dirty="0">
+              <a:solidFill>
+                <a:schemeClr val="tx1"/>
+              </a:solidFill>
+            </a:endParaRPr>
+          </a:p>
+        </p:txBody>
+      </p:sp>
+      <p:cxnSp>
+        <p:nvCxnSpPr>
+          <p:cNvPr id="53" name="연결선: 꺾임 52">
+            <a:extLst>
+              <a:ext uri="{FF2B5EF4-FFF2-40B4-BE49-F238E27FC236}">
+                <a16:creationId xmlns:a16="http://schemas.microsoft.com/office/drawing/2014/main" id="{1FFEC3D9-4DB6-DAC5-9965-36ADDD50F621}"/>
+              </a:ext>
+            </a:extLst>
+          </p:cNvPr>
+          <p:cNvCxnSpPr>
+            <a:cxnSpLocks/>
+            <a:endCxn id="47" idx="0"/>
+          </p:cNvCxnSpPr>
+          <p:nvPr/>
+        </p:nvCxnSpPr>
+        <p:spPr>
+          <a:xfrm rot="16200000" flipH="1">
+            <a:off x="3925418" y="3355710"/>
+            <a:ext cx="1602029" cy="194701"/>
+          </a:xfrm>
+          <a:prstGeom prst="bentConnector3">
+            <a:avLst>
+              <a:gd name="adj1" fmla="val 50000"/>
+            </a:avLst>
+          </a:prstGeom>
+          <a:ln w="25400">
+            <a:tailEnd type="triangle"/>
+          </a:ln>
+        </p:spPr>
+        <p:style>
+          <a:lnRef idx="1">
+            <a:schemeClr val="dk1"/>
+          </a:lnRef>
+          <a:fillRef idx="0">
+            <a:schemeClr val="dk1"/>
+          </a:fillRef>
+          <a:effectRef idx="0">
+            <a:schemeClr val="dk1"/>
+          </a:effectRef>
+          <a:fontRef idx="minor">
+            <a:schemeClr val="tx1"/>
+          </a:fontRef>
+        </p:style>
+      </p:cxnSp>
+      <p:sp>
+        <p:nvSpPr>
+          <p:cNvPr id="54" name="TextBox 53">
+            <a:extLst>
+              <a:ext uri="{FF2B5EF4-FFF2-40B4-BE49-F238E27FC236}">
+                <a16:creationId xmlns:a16="http://schemas.microsoft.com/office/drawing/2014/main" id="{0E24183F-9031-9203-06BC-349BD75B40CA}"/>
+              </a:ext>
+            </a:extLst>
+          </p:cNvPr>
+          <p:cNvSpPr txBox="1"/>
+          <p:nvPr/>
+        </p:nvSpPr>
+        <p:spPr>
+          <a:xfrm>
+            <a:off x="4270171" y="4911834"/>
+            <a:ext cx="875916" cy="292388"/>
+          </a:xfrm>
+          <a:prstGeom prst="rect">
+            <a:avLst/>
+          </a:prstGeom>
+          <a:noFill/>
+        </p:spPr>
+        <p:txBody>
+          <a:bodyPr wrap="square" rtlCol="0">
+            <a:spAutoFit/>
+          </a:bodyPr>
+          <a:lstStyle/>
+          <a:p>
+            <a:pPr algn="ctr"/>
+            <a:r>
+              <a:rPr kumimoji="1" lang="en-US" altLang="ko-Kore-KR" sz="1300"/>
+              <a:t>RF SPDT</a:t>
+            </a:r>
+            <a:endParaRPr kumimoji="1" lang="ko-Kore-KR" altLang="en-US" sz="1300" dirty="0"/>
+          </a:p>
+        </p:txBody>
+      </p:sp>
+      <p:sp>
+        <p:nvSpPr>
+          <p:cNvPr id="55" name="TextBox 54">
+            <a:extLst>
+              <a:ext uri="{FF2B5EF4-FFF2-40B4-BE49-F238E27FC236}">
+                <a16:creationId xmlns:a16="http://schemas.microsoft.com/office/drawing/2014/main" id="{F158E427-4768-0967-18DB-0EC487444342}"/>
+              </a:ext>
+            </a:extLst>
+          </p:cNvPr>
+          <p:cNvSpPr txBox="1"/>
+          <p:nvPr/>
+        </p:nvSpPr>
+        <p:spPr>
+          <a:xfrm>
+            <a:off x="433449" y="694706"/>
+            <a:ext cx="1424493" cy="369332"/>
+          </a:xfrm>
+          <a:prstGeom prst="rect">
+            <a:avLst/>
+          </a:prstGeom>
+          <a:noFill/>
+        </p:spPr>
+        <p:txBody>
+          <a:bodyPr wrap="none" rtlCol="0">
+            <a:spAutoFit/>
+          </a:bodyPr>
+          <a:lstStyle/>
+          <a:p>
+            <a:r>
+              <a:rPr lang="en-US" altLang="ko-KR"/>
+              <a:t>DAC</a:t>
+            </a:r>
+            <a:r>
+              <a:rPr lang="ko-KR" altLang="en-US"/>
+              <a:t> </a:t>
+            </a:r>
+            <a:r>
+              <a:rPr lang="en-US" altLang="ko-KR"/>
+              <a:t>output</a:t>
+            </a:r>
+            <a:endParaRPr lang="ko-KR" altLang="en-US"/>
+          </a:p>
+        </p:txBody>
+      </p:sp>
+      <p:sp>
+        <p:nvSpPr>
+          <p:cNvPr id="63" name="TextBox 62">
+            <a:extLst>
+              <a:ext uri="{FF2B5EF4-FFF2-40B4-BE49-F238E27FC236}">
+                <a16:creationId xmlns:a16="http://schemas.microsoft.com/office/drawing/2014/main" id="{0B8EC698-4380-CEE5-22A4-1C8347F7F478}"/>
+              </a:ext>
+            </a:extLst>
+          </p:cNvPr>
+          <p:cNvSpPr txBox="1"/>
+          <p:nvPr/>
+        </p:nvSpPr>
+        <p:spPr>
+          <a:xfrm>
+            <a:off x="6229054" y="3054627"/>
+            <a:ext cx="2359671" cy="369332"/>
+          </a:xfrm>
+          <a:prstGeom prst="rect">
+            <a:avLst/>
+          </a:prstGeom>
+          <a:noFill/>
+        </p:spPr>
+        <p:txBody>
+          <a:bodyPr wrap="square">
+            <a:spAutoFit/>
+          </a:bodyPr>
+          <a:lstStyle/>
+          <a:p>
+            <a:pPr algn="ctr"/>
+            <a:r>
+              <a:rPr lang="en-US" altLang="ko-KR" sz="1800" b="1" i="0">
+                <a:effectLst/>
+              </a:rPr>
+              <a:t>PAT1220-C-9DB-T5</a:t>
+            </a:r>
+            <a:endParaRPr lang="ko-KR" altLang="en-US" b="1"/>
+          </a:p>
+        </p:txBody>
+      </p:sp>
+      <p:sp>
+        <p:nvSpPr>
+          <p:cNvPr id="65" name="TextBox 64">
+            <a:extLst>
+              <a:ext uri="{FF2B5EF4-FFF2-40B4-BE49-F238E27FC236}">
+                <a16:creationId xmlns:a16="http://schemas.microsoft.com/office/drawing/2014/main" id="{C8DB26B4-973A-8602-480C-579F69AEE790}"/>
+              </a:ext>
+            </a:extLst>
+          </p:cNvPr>
+          <p:cNvSpPr txBox="1"/>
+          <p:nvPr/>
+        </p:nvSpPr>
+        <p:spPr>
+          <a:xfrm>
+            <a:off x="8544583" y="3041686"/>
+            <a:ext cx="1907517" cy="369332"/>
+          </a:xfrm>
+          <a:prstGeom prst="rect">
+            <a:avLst/>
+          </a:prstGeom>
+          <a:noFill/>
+        </p:spPr>
+        <p:txBody>
+          <a:bodyPr wrap="square">
+            <a:spAutoFit/>
+          </a:bodyPr>
+          <a:lstStyle/>
+          <a:p>
+            <a:pPr algn="ctr"/>
+            <a:r>
+              <a:rPr kumimoji="1" lang="en-US" altLang="en-US" sz="1800" b="1"/>
+              <a:t>ERA-3SM+ </a:t>
+            </a:r>
+            <a:endParaRPr lang="ko-KR" altLang="en-US" b="1"/>
+          </a:p>
+        </p:txBody>
+      </p:sp>
+      <p:cxnSp>
+        <p:nvCxnSpPr>
+          <p:cNvPr id="67" name="직선 연결선 66">
+            <a:extLst>
+              <a:ext uri="{FF2B5EF4-FFF2-40B4-BE49-F238E27FC236}">
+                <a16:creationId xmlns:a16="http://schemas.microsoft.com/office/drawing/2014/main" id="{1C0DE481-3BA8-5133-C25A-5A56EA16280A}"/>
+              </a:ext>
+            </a:extLst>
+          </p:cNvPr>
+          <p:cNvCxnSpPr>
+            <a:cxnSpLocks/>
+            <a:stCxn id="10" idx="0"/>
+            <a:endCxn id="63" idx="2"/>
+          </p:cNvCxnSpPr>
+          <p:nvPr/>
+        </p:nvCxnSpPr>
+        <p:spPr>
+          <a:xfrm flipV="1">
+            <a:off x="7105771" y="3423959"/>
+            <a:ext cx="303119" cy="549551"/>
+          </a:xfrm>
+          <a:prstGeom prst="line">
+            <a:avLst/>
+          </a:prstGeom>
+          <a:ln w="19050">
+            <a:prstDash val="lgDash"/>
+          </a:ln>
         </p:spPr>
         <p:style>
           <a:lnRef idx="1">
@@ -7469,29 +7799,31 @@
       </p:cxnSp>
       <p:cxnSp>
         <p:nvCxnSpPr>
-          <p:cNvPr id="51" name="직선 연결선[R] 92">
-            <a:extLst>
-              <a:ext uri="{FF2B5EF4-FFF2-40B4-BE49-F238E27FC236}">
-                <a16:creationId xmlns:a16="http://schemas.microsoft.com/office/drawing/2014/main" id="{CF163EDA-1A78-7604-2020-9EF81B247438}"/>
+          <p:cNvPr id="68" name="직선 연결선 67">
+            <a:extLst>
+              <a:ext uri="{FF2B5EF4-FFF2-40B4-BE49-F238E27FC236}">
+                <a16:creationId xmlns:a16="http://schemas.microsoft.com/office/drawing/2014/main" id="{C9543972-CC59-38BB-5397-A5A3599AF430}"/>
               </a:ext>
             </a:extLst>
           </p:cNvPr>
           <p:cNvCxnSpPr>
             <a:cxnSpLocks/>
-            <a:stCxn id="44" idx="1"/>
-            <a:endCxn id="4" idx="0"/>
+            <a:stCxn id="4" idx="1"/>
+            <a:endCxn id="65" idx="2"/>
           </p:cNvCxnSpPr>
           <p:nvPr/>
         </p:nvCxnSpPr>
         <p:spPr>
-          <a:xfrm flipH="1">
-            <a:off x="8011950" y="4286316"/>
-            <a:ext cx="152028" cy="0"/>
+          <a:xfrm flipV="1">
+            <a:off x="7873421" y="3411018"/>
+            <a:ext cx="1624921" cy="731176"/>
           </a:xfrm>
           <a:prstGeom prst="line">
             <a:avLst/>
           </a:prstGeom>
-          <a:ln w="25400"/>
+          <a:ln w="19050">
+            <a:prstDash val="lgDash"/>
+          </a:ln>
         </p:spPr>
         <p:style>
           <a:lnRef idx="1">
@@ -7510,10 +7842,397 @@
       </p:cxnSp>
       <p:sp>
         <p:nvSpPr>
-          <p:cNvPr id="52" name="직사각형 51">
-            <a:extLst>
-              <a:ext uri="{FF2B5EF4-FFF2-40B4-BE49-F238E27FC236}">
-                <a16:creationId xmlns:a16="http://schemas.microsoft.com/office/drawing/2014/main" id="{6FA0557C-F19F-27EF-8C92-0CAADD6C57DC}"/>
+          <p:cNvPr id="71" name="TextBox 70">
+            <a:extLst>
+              <a:ext uri="{FF2B5EF4-FFF2-40B4-BE49-F238E27FC236}">
+                <a16:creationId xmlns:a16="http://schemas.microsoft.com/office/drawing/2014/main" id="{9F0E31F0-0209-07AF-029B-C66C3EFA5533}"/>
+              </a:ext>
+            </a:extLst>
+          </p:cNvPr>
+          <p:cNvSpPr txBox="1"/>
+          <p:nvPr/>
+        </p:nvSpPr>
+        <p:spPr>
+          <a:xfrm>
+            <a:off x="4649109" y="3054627"/>
+            <a:ext cx="1597156" cy="369332"/>
+          </a:xfrm>
+          <a:prstGeom prst="rect">
+            <a:avLst/>
+          </a:prstGeom>
+          <a:noFill/>
+        </p:spPr>
+        <p:txBody>
+          <a:bodyPr wrap="square">
+            <a:spAutoFit/>
+          </a:bodyPr>
+          <a:lstStyle/>
+          <a:p>
+            <a:pPr algn="ctr"/>
+            <a:r>
+              <a:rPr lang="en-US" altLang="ko-KR" sz="1800" i="0">
+                <a:effectLst/>
+              </a:rPr>
+              <a:t>Eliptical filter</a:t>
+            </a:r>
+            <a:endParaRPr lang="ko-KR" altLang="en-US"/>
+          </a:p>
+        </p:txBody>
+      </p:sp>
+      <p:cxnSp>
+        <p:nvCxnSpPr>
+          <p:cNvPr id="72" name="직선 연결선 71">
+            <a:extLst>
+              <a:ext uri="{FF2B5EF4-FFF2-40B4-BE49-F238E27FC236}">
+                <a16:creationId xmlns:a16="http://schemas.microsoft.com/office/drawing/2014/main" id="{2BA12069-7DCA-7D8D-5E40-FB2B9CE44E8A}"/>
+              </a:ext>
+            </a:extLst>
+          </p:cNvPr>
+          <p:cNvCxnSpPr>
+            <a:cxnSpLocks/>
+            <a:stCxn id="6" idx="0"/>
+            <a:endCxn id="71" idx="2"/>
+          </p:cNvCxnSpPr>
+          <p:nvPr/>
+        </p:nvCxnSpPr>
+        <p:spPr>
+          <a:xfrm flipV="1">
+            <a:off x="5376743" y="3423959"/>
+            <a:ext cx="70944" cy="548939"/>
+          </a:xfrm>
+          <a:prstGeom prst="line">
+            <a:avLst/>
+          </a:prstGeom>
+          <a:ln w="19050">
+            <a:prstDash val="lgDash"/>
+          </a:ln>
+        </p:spPr>
+        <p:style>
+          <a:lnRef idx="1">
+            <a:schemeClr val="dk1"/>
+          </a:lnRef>
+          <a:fillRef idx="0">
+            <a:schemeClr val="dk1"/>
+          </a:fillRef>
+          <a:effectRef idx="0">
+            <a:schemeClr val="dk1"/>
+          </a:effectRef>
+          <a:fontRef idx="minor">
+            <a:schemeClr val="tx1"/>
+          </a:fontRef>
+        </p:style>
+      </p:cxnSp>
+      <p:sp>
+        <p:nvSpPr>
+          <p:cNvPr id="77" name="TextBox 76">
+            <a:extLst>
+              <a:ext uri="{FF2B5EF4-FFF2-40B4-BE49-F238E27FC236}">
+                <a16:creationId xmlns:a16="http://schemas.microsoft.com/office/drawing/2014/main" id="{A897D51F-BF9D-FBAB-0F0F-69F1B253F5E3}"/>
+              </a:ext>
+            </a:extLst>
+          </p:cNvPr>
+          <p:cNvSpPr txBox="1"/>
+          <p:nvPr/>
+        </p:nvSpPr>
+        <p:spPr>
+          <a:xfrm>
+            <a:off x="3024797" y="3054627"/>
+            <a:ext cx="1597156" cy="369332"/>
+          </a:xfrm>
+          <a:prstGeom prst="rect">
+            <a:avLst/>
+          </a:prstGeom>
+          <a:noFill/>
+        </p:spPr>
+        <p:txBody>
+          <a:bodyPr wrap="square">
+            <a:spAutoFit/>
+          </a:bodyPr>
+          <a:lstStyle/>
+          <a:p>
+            <a:pPr algn="ctr"/>
+            <a:r>
+              <a:rPr lang="en-US" altLang="ko-KR" sz="1800" b="1" i="0">
+                <a:effectLst/>
+              </a:rPr>
+              <a:t>TC2-72T+</a:t>
+            </a:r>
+            <a:endParaRPr lang="ko-KR" altLang="en-US" b="1"/>
+          </a:p>
+        </p:txBody>
+      </p:sp>
+      <p:cxnSp>
+        <p:nvCxnSpPr>
+          <p:cNvPr id="78" name="직선 연결선 77">
+            <a:extLst>
+              <a:ext uri="{FF2B5EF4-FFF2-40B4-BE49-F238E27FC236}">
+                <a16:creationId xmlns:a16="http://schemas.microsoft.com/office/drawing/2014/main" id="{3F47FBC5-D47D-96C3-062A-7F9975F38C28}"/>
+              </a:ext>
+            </a:extLst>
+          </p:cNvPr>
+          <p:cNvCxnSpPr>
+            <a:cxnSpLocks/>
+            <a:stCxn id="15" idx="0"/>
+            <a:endCxn id="77" idx="2"/>
+          </p:cNvCxnSpPr>
+          <p:nvPr/>
+        </p:nvCxnSpPr>
+        <p:spPr>
+          <a:xfrm flipH="1" flipV="1">
+            <a:off x="3823375" y="3423959"/>
+            <a:ext cx="266876" cy="818253"/>
+          </a:xfrm>
+          <a:prstGeom prst="line">
+            <a:avLst/>
+          </a:prstGeom>
+          <a:ln w="19050">
+            <a:prstDash val="lgDash"/>
+          </a:ln>
+        </p:spPr>
+        <p:style>
+          <a:lnRef idx="1">
+            <a:schemeClr val="dk1"/>
+          </a:lnRef>
+          <a:fillRef idx="0">
+            <a:schemeClr val="dk1"/>
+          </a:fillRef>
+          <a:effectRef idx="0">
+            <a:schemeClr val="dk1"/>
+          </a:effectRef>
+          <a:fontRef idx="minor">
+            <a:schemeClr val="tx1"/>
+          </a:fontRef>
+        </p:style>
+      </p:cxnSp>
+      <p:sp>
+        <p:nvSpPr>
+          <p:cNvPr id="85" name="TextBox 84">
+            <a:extLst>
+              <a:ext uri="{FF2B5EF4-FFF2-40B4-BE49-F238E27FC236}">
+                <a16:creationId xmlns:a16="http://schemas.microsoft.com/office/drawing/2014/main" id="{B5FDF0A2-7BFA-0D58-374B-3F3178B85068}"/>
+              </a:ext>
+            </a:extLst>
+          </p:cNvPr>
+          <p:cNvSpPr txBox="1"/>
+          <p:nvPr/>
+        </p:nvSpPr>
+        <p:spPr>
+          <a:xfrm>
+            <a:off x="4095341" y="6343234"/>
+            <a:ext cx="1788397" cy="369332"/>
+          </a:xfrm>
+          <a:prstGeom prst="rect">
+            <a:avLst/>
+          </a:prstGeom>
+          <a:noFill/>
+        </p:spPr>
+        <p:txBody>
+          <a:bodyPr wrap="square">
+            <a:spAutoFit/>
+          </a:bodyPr>
+          <a:lstStyle/>
+          <a:p>
+            <a:pPr algn="ctr"/>
+            <a:r>
+              <a:rPr lang="en-US" altLang="ko-KR" sz="1800" b="1" i="0" u="none" strike="noStrike">
+                <a:solidFill>
+                  <a:srgbClr val="000000"/>
+                </a:solidFill>
+                <a:effectLst/>
+                <a:latin typeface="맑은 고딕" panose="020B0503020000020004" pitchFamily="50" charset="-127"/>
+                <a:ea typeface="맑은 고딕" panose="020B0503020000020004" pitchFamily="50" charset="-127"/>
+              </a:rPr>
+              <a:t>DAT-31A-PP+</a:t>
+            </a:r>
+            <a:r>
+              <a:rPr lang="en-US" altLang="ko-KR" b="1"/>
+              <a:t> </a:t>
+            </a:r>
+            <a:endParaRPr lang="ko-KR" altLang="en-US" b="1"/>
+          </a:p>
+        </p:txBody>
+      </p:sp>
+      <p:cxnSp>
+        <p:nvCxnSpPr>
+          <p:cNvPr id="86" name="직선 연결선 85">
+            <a:extLst>
+              <a:ext uri="{FF2B5EF4-FFF2-40B4-BE49-F238E27FC236}">
+                <a16:creationId xmlns:a16="http://schemas.microsoft.com/office/drawing/2014/main" id="{D3D93FAB-DC53-BC34-D1CE-5B7B0B80A202}"/>
+              </a:ext>
+            </a:extLst>
+          </p:cNvPr>
+          <p:cNvCxnSpPr>
+            <a:cxnSpLocks/>
+            <a:stCxn id="85" idx="0"/>
+            <a:endCxn id="37" idx="2"/>
+          </p:cNvCxnSpPr>
+          <p:nvPr/>
+        </p:nvCxnSpPr>
+        <p:spPr>
+          <a:xfrm flipV="1">
+            <a:off x="4989540" y="5099419"/>
+            <a:ext cx="1288471" cy="1243815"/>
+          </a:xfrm>
+          <a:prstGeom prst="line">
+            <a:avLst/>
+          </a:prstGeom>
+          <a:ln w="19050">
+            <a:prstDash val="lgDash"/>
+          </a:ln>
+        </p:spPr>
+        <p:style>
+          <a:lnRef idx="1">
+            <a:schemeClr val="dk1"/>
+          </a:lnRef>
+          <a:fillRef idx="0">
+            <a:schemeClr val="dk1"/>
+          </a:fillRef>
+          <a:effectRef idx="0">
+            <a:schemeClr val="dk1"/>
+          </a:effectRef>
+          <a:fontRef idx="minor">
+            <a:schemeClr val="tx1"/>
+          </a:fontRef>
+        </p:style>
+      </p:cxnSp>
+      <p:sp>
+        <p:nvSpPr>
+          <p:cNvPr id="92" name="TextBox 91">
+            <a:extLst>
+              <a:ext uri="{FF2B5EF4-FFF2-40B4-BE49-F238E27FC236}">
+                <a16:creationId xmlns:a16="http://schemas.microsoft.com/office/drawing/2014/main" id="{F2B16B54-45A7-6276-FBAB-FB60ECC4B8FB}"/>
+              </a:ext>
+            </a:extLst>
+          </p:cNvPr>
+          <p:cNvSpPr txBox="1"/>
+          <p:nvPr/>
+        </p:nvSpPr>
+        <p:spPr>
+          <a:xfrm>
+            <a:off x="6375581" y="2669087"/>
+            <a:ext cx="1788397" cy="369332"/>
+          </a:xfrm>
+          <a:prstGeom prst="rect">
+            <a:avLst/>
+          </a:prstGeom>
+          <a:noFill/>
+        </p:spPr>
+        <p:txBody>
+          <a:bodyPr wrap="square">
+            <a:spAutoFit/>
+          </a:bodyPr>
+          <a:lstStyle/>
+          <a:p>
+            <a:pPr algn="ctr"/>
+            <a:r>
+              <a:rPr lang="en-US" altLang="ko-KR" sz="1800" b="0" i="0" u="none" strike="noStrike">
+                <a:solidFill>
+                  <a:srgbClr val="000000"/>
+                </a:solidFill>
+                <a:effectLst/>
+                <a:latin typeface="맑은 고딕" panose="020B0503020000020004" pitchFamily="50" charset="-127"/>
+                <a:ea typeface="맑은 고딕" panose="020B0503020000020004" pitchFamily="50" charset="-127"/>
+              </a:rPr>
+              <a:t>5 digital pins</a:t>
+            </a:r>
+            <a:endParaRPr lang="ko-KR" altLang="en-US"/>
+          </a:p>
+        </p:txBody>
+      </p:sp>
+      <p:sp>
+        <p:nvSpPr>
+          <p:cNvPr id="93" name="TextBox 92">
+            <a:extLst>
+              <a:ext uri="{FF2B5EF4-FFF2-40B4-BE49-F238E27FC236}">
+                <a16:creationId xmlns:a16="http://schemas.microsoft.com/office/drawing/2014/main" id="{5BD01865-6106-1C39-CAD0-3C6D458A52C7}"/>
+              </a:ext>
+            </a:extLst>
+          </p:cNvPr>
+          <p:cNvSpPr txBox="1"/>
+          <p:nvPr/>
+        </p:nvSpPr>
+        <p:spPr>
+          <a:xfrm>
+            <a:off x="3005014" y="2663944"/>
+            <a:ext cx="1788397" cy="369332"/>
+          </a:xfrm>
+          <a:prstGeom prst="rect">
+            <a:avLst/>
+          </a:prstGeom>
+          <a:noFill/>
+        </p:spPr>
+        <p:txBody>
+          <a:bodyPr wrap="square">
+            <a:spAutoFit/>
+          </a:bodyPr>
+          <a:lstStyle/>
+          <a:p>
+            <a:pPr algn="ctr"/>
+            <a:r>
+              <a:rPr lang="en-US" altLang="ko-KR" sz="1800" b="0" i="0" u="none" strike="noStrike">
+                <a:solidFill>
+                  <a:srgbClr val="000000"/>
+                </a:solidFill>
+                <a:effectLst/>
+                <a:latin typeface="맑은 고딕" panose="020B0503020000020004" pitchFamily="50" charset="-127"/>
+                <a:ea typeface="맑은 고딕" panose="020B0503020000020004" pitchFamily="50" charset="-127"/>
+              </a:rPr>
+              <a:t>1 digital pin</a:t>
+            </a:r>
+            <a:endParaRPr lang="ko-KR" altLang="en-US"/>
+          </a:p>
+        </p:txBody>
+      </p:sp>
+      <p:sp>
+        <p:nvSpPr>
+          <p:cNvPr id="97" name="TextBox 96">
+            <a:extLst>
+              <a:ext uri="{FF2B5EF4-FFF2-40B4-BE49-F238E27FC236}">
+                <a16:creationId xmlns:a16="http://schemas.microsoft.com/office/drawing/2014/main" id="{30384885-52E9-B1DA-83C2-4D9AEF36CD1E}"/>
+              </a:ext>
+            </a:extLst>
+          </p:cNvPr>
+          <p:cNvSpPr txBox="1"/>
+          <p:nvPr/>
+        </p:nvSpPr>
+        <p:spPr>
+          <a:xfrm>
+            <a:off x="9351817" y="6458559"/>
+            <a:ext cx="2739153" cy="369332"/>
+          </a:xfrm>
+          <a:prstGeom prst="rect">
+            <a:avLst/>
+          </a:prstGeom>
+          <a:noFill/>
+        </p:spPr>
+        <p:txBody>
+          <a:bodyPr wrap="square">
+            <a:spAutoFit/>
+          </a:bodyPr>
+          <a:lstStyle/>
+          <a:p>
+            <a:pPr algn="ctr"/>
+            <a:r>
+              <a:rPr lang="en-US" altLang="ko-KR" sz="1800" b="0" i="0" u="none" strike="noStrike">
+                <a:solidFill>
+                  <a:srgbClr val="000000"/>
+                </a:solidFill>
+                <a:effectLst/>
+                <a:latin typeface="맑은 고딕" panose="020B0503020000020004" pitchFamily="50" charset="-127"/>
+                <a:ea typeface="맑은 고딕" panose="020B0503020000020004" pitchFamily="50" charset="-127"/>
+              </a:rPr>
+              <a:t>or total 13dB attenuator?</a:t>
+            </a:r>
+            <a:endParaRPr lang="ko-KR" altLang="en-US"/>
+          </a:p>
+        </p:txBody>
+      </p:sp>
+      <p:sp>
+        <p:nvSpPr>
+          <p:cNvPr id="3" name="직사각형 2">
+            <a:extLst>
+              <a:ext uri="{FF2B5EF4-FFF2-40B4-BE49-F238E27FC236}">
+                <a16:creationId xmlns:a16="http://schemas.microsoft.com/office/drawing/2014/main" id="{C3963A32-F26D-E111-40EE-3C91548A29E2}"/>
               </a:ext>
             </a:extLst>
           </p:cNvPr>
@@ -7522,8 +8241,8 @@
         </p:nvSpPr>
         <p:spPr>
           <a:xfrm>
-            <a:off x="8163978" y="5682640"/>
-            <a:ext cx="1187839" cy="775919"/>
+            <a:off x="4446773" y="1033825"/>
+            <a:ext cx="1886016" cy="1585980"/>
           </a:xfrm>
           <a:prstGeom prst="rect">
             <a:avLst/>
@@ -7553,59 +8272,196 @@
           <a:p>
             <a:pPr algn="ctr"/>
             <a:r>
-              <a:rPr kumimoji="1" lang="en-US" altLang="ko-Kore-KR">
+              <a:rPr kumimoji="1" lang="en-US" altLang="en-US">
                 <a:solidFill>
                   <a:schemeClr val="tx1"/>
                 </a:solidFill>
               </a:rPr>
-              <a:t>SMA </a:t>
+              <a:t>CPLD</a:t>
             </a:r>
           </a:p>
           <a:p>
             <a:pPr algn="ctr"/>
             <a:r>
-              <a:rPr kumimoji="1" lang="en-US" altLang="ko-Kore-KR">
+              <a:rPr lang="en-US" altLang="ko-KR" b="1" i="0">
+                <a:solidFill>
+                  <a:srgbClr val="333333"/>
+                </a:solidFill>
+                <a:effectLst/>
+                <a:latin typeface="Arial" panose="020B0604020202020204" pitchFamily="34" charset="0"/>
+              </a:rPr>
+              <a:t>XC2C128-7VQG100I</a:t>
+            </a:r>
+          </a:p>
+        </p:txBody>
+      </p:sp>
+      <p:sp>
+        <p:nvSpPr>
+          <p:cNvPr id="64" name="TextBox 24">
+            <a:extLst>
+              <a:ext uri="{FF2B5EF4-FFF2-40B4-BE49-F238E27FC236}">
+                <a16:creationId xmlns:a16="http://schemas.microsoft.com/office/drawing/2014/main" id="{5425818D-6BC4-2E0B-AFCD-2F0E8AE2597C}"/>
+              </a:ext>
+            </a:extLst>
+          </p:cNvPr>
+          <p:cNvSpPr txBox="1"/>
+          <p:nvPr/>
+        </p:nvSpPr>
+        <p:spPr>
+          <a:xfrm>
+            <a:off x="2014568" y="5881569"/>
+            <a:ext cx="3025902" cy="923330"/>
+          </a:xfrm>
+          <a:prstGeom prst="rect">
+            <a:avLst/>
+          </a:prstGeom>
+          <a:noFill/>
+        </p:spPr>
+        <p:txBody>
+          <a:bodyPr wrap="square" rtlCol="0">
+            <a:spAutoFit/>
+          </a:bodyPr>
+          <a:lstStyle>
+            <a:defPPr>
+              <a:defRPr lang="ko-Kore-KR"/>
+            </a:defPPr>
+            <a:lvl1pPr marL="0" algn="l" defTabSz="914400" rtl="0" eaLnBrk="1" latinLnBrk="0" hangingPunct="1">
+              <a:defRPr sz="1800" kern="1200">
                 <a:solidFill>
                   <a:schemeClr val="tx1"/>
                 </a:solidFill>
-              </a:rPr>
-              <a:t>output</a:t>
-            </a:r>
-            <a:endParaRPr kumimoji="1" lang="ko-Kore-KR" altLang="en-US" dirty="0">
-              <a:solidFill>
-                <a:schemeClr val="tx1"/>
-              </a:solidFill>
-            </a:endParaRPr>
+                <a:latin typeface="+mn-lt"/>
+                <a:ea typeface="+mn-ea"/>
+                <a:cs typeface="+mn-cs"/>
+              </a:defRPr>
+            </a:lvl1pPr>
+            <a:lvl2pPr marL="457200" algn="l" defTabSz="914400" rtl="0" eaLnBrk="1" latinLnBrk="0" hangingPunct="1">
+              <a:defRPr sz="1800" kern="1200">
+                <a:solidFill>
+                  <a:schemeClr val="tx1"/>
+                </a:solidFill>
+                <a:latin typeface="+mn-lt"/>
+                <a:ea typeface="+mn-ea"/>
+                <a:cs typeface="+mn-cs"/>
+              </a:defRPr>
+            </a:lvl2pPr>
+            <a:lvl3pPr marL="914400" algn="l" defTabSz="914400" rtl="0" eaLnBrk="1" latinLnBrk="0" hangingPunct="1">
+              <a:defRPr sz="1800" kern="1200">
+                <a:solidFill>
+                  <a:schemeClr val="tx1"/>
+                </a:solidFill>
+                <a:latin typeface="+mn-lt"/>
+                <a:ea typeface="+mn-ea"/>
+                <a:cs typeface="+mn-cs"/>
+              </a:defRPr>
+            </a:lvl3pPr>
+            <a:lvl4pPr marL="1371600" algn="l" defTabSz="914400" rtl="0" eaLnBrk="1" latinLnBrk="0" hangingPunct="1">
+              <a:defRPr sz="1800" kern="1200">
+                <a:solidFill>
+                  <a:schemeClr val="tx1"/>
+                </a:solidFill>
+                <a:latin typeface="+mn-lt"/>
+                <a:ea typeface="+mn-ea"/>
+                <a:cs typeface="+mn-cs"/>
+              </a:defRPr>
+            </a:lvl4pPr>
+            <a:lvl5pPr marL="1828800" algn="l" defTabSz="914400" rtl="0" eaLnBrk="1" latinLnBrk="0" hangingPunct="1">
+              <a:defRPr sz="1800" kern="1200">
+                <a:solidFill>
+                  <a:schemeClr val="tx1"/>
+                </a:solidFill>
+                <a:latin typeface="+mn-lt"/>
+                <a:ea typeface="+mn-ea"/>
+                <a:cs typeface="+mn-cs"/>
+              </a:defRPr>
+            </a:lvl5pPr>
+            <a:lvl6pPr marL="2286000" algn="l" defTabSz="914400" rtl="0" eaLnBrk="1" latinLnBrk="0" hangingPunct="1">
+              <a:defRPr sz="1800" kern="1200">
+                <a:solidFill>
+                  <a:schemeClr val="tx1"/>
+                </a:solidFill>
+                <a:latin typeface="+mn-lt"/>
+                <a:ea typeface="+mn-ea"/>
+                <a:cs typeface="+mn-cs"/>
+              </a:defRPr>
+            </a:lvl6pPr>
+            <a:lvl7pPr marL="2743200" algn="l" defTabSz="914400" rtl="0" eaLnBrk="1" latinLnBrk="0" hangingPunct="1">
+              <a:defRPr sz="1800" kern="1200">
+                <a:solidFill>
+                  <a:schemeClr val="tx1"/>
+                </a:solidFill>
+                <a:latin typeface="+mn-lt"/>
+                <a:ea typeface="+mn-ea"/>
+                <a:cs typeface="+mn-cs"/>
+              </a:defRPr>
+            </a:lvl7pPr>
+            <a:lvl8pPr marL="3200400" algn="l" defTabSz="914400" rtl="0" eaLnBrk="1" latinLnBrk="0" hangingPunct="1">
+              <a:defRPr sz="1800" kern="1200">
+                <a:solidFill>
+                  <a:schemeClr val="tx1"/>
+                </a:solidFill>
+                <a:latin typeface="+mn-lt"/>
+                <a:ea typeface="+mn-ea"/>
+                <a:cs typeface="+mn-cs"/>
+              </a:defRPr>
+            </a:lvl8pPr>
+            <a:lvl9pPr marL="3657600" algn="l" defTabSz="914400" rtl="0" eaLnBrk="1" latinLnBrk="0" hangingPunct="1">
+              <a:defRPr sz="1800" kern="1200">
+                <a:solidFill>
+                  <a:schemeClr val="tx1"/>
+                </a:solidFill>
+                <a:latin typeface="+mn-lt"/>
+                <a:ea typeface="+mn-ea"/>
+                <a:cs typeface="+mn-cs"/>
+              </a:defRPr>
+            </a:lvl9pPr>
+          </a:lstStyle>
+          <a:p>
+            <a:r>
+              <a:rPr lang="en-US" altLang="ko-KR" b="1" dirty="0"/>
+              <a:t>HMC545A</a:t>
+            </a:r>
+          </a:p>
+          <a:p>
+            <a:r>
+              <a:rPr lang="en-US" altLang="ko-KR" b="1" dirty="0"/>
+              <a:t>QPC7522</a:t>
+            </a:r>
+          </a:p>
+          <a:p>
+            <a:r>
+              <a:rPr lang="en-US" altLang="ko-KR" b="1" dirty="0"/>
+              <a:t>HSWA2-30DR+</a:t>
+            </a:r>
+            <a:endParaRPr lang="ko-KR" altLang="en-US" b="1" dirty="0"/>
           </a:p>
         </p:txBody>
       </p:sp>
       <p:cxnSp>
         <p:nvCxnSpPr>
-          <p:cNvPr id="53" name="연결선: 꺾임 52">
-            <a:extLst>
-              <a:ext uri="{FF2B5EF4-FFF2-40B4-BE49-F238E27FC236}">
-                <a16:creationId xmlns:a16="http://schemas.microsoft.com/office/drawing/2014/main" id="{1FFEC3D9-4DB6-DAC5-9965-36ADDD50F621}"/>
+          <p:cNvPr id="66" name="직선 연결선 65">
+            <a:extLst>
+              <a:ext uri="{FF2B5EF4-FFF2-40B4-BE49-F238E27FC236}">
+                <a16:creationId xmlns:a16="http://schemas.microsoft.com/office/drawing/2014/main" id="{4EB82198-2F69-85FE-EEE1-EDCA9E873451}"/>
               </a:ext>
             </a:extLst>
           </p:cNvPr>
           <p:cNvCxnSpPr>
             <a:cxnSpLocks/>
-            <a:endCxn id="47" idx="0"/>
+            <a:stCxn id="54" idx="2"/>
           </p:cNvCxnSpPr>
           <p:nvPr/>
         </p:nvCxnSpPr>
         <p:spPr>
-          <a:xfrm rot="16200000" flipH="1">
-            <a:off x="3881394" y="3311686"/>
-            <a:ext cx="1585981" cy="298797"/>
-          </a:xfrm>
-          <a:prstGeom prst="bentConnector3">
-            <a:avLst>
-              <a:gd name="adj1" fmla="val 50000"/>
-            </a:avLst>
-          </a:prstGeom>
-          <a:ln w="25400">
-            <a:tailEnd type="triangle"/>
+          <a:xfrm flipH="1">
+            <a:off x="3564826" y="5204222"/>
+            <a:ext cx="1143303" cy="593569"/>
+          </a:xfrm>
+          <a:prstGeom prst="line">
+            <a:avLst/>
+          </a:prstGeom>
+          <a:ln w="19050">
+            <a:prstDash val="lgDash"/>
           </a:ln>
         </p:spPr>
         <p:style>
@@ -7625,10 +8481,175 @@
       </p:cxnSp>
       <p:sp>
         <p:nvSpPr>
-          <p:cNvPr id="54" name="TextBox 53">
-            <a:extLst>
-              <a:ext uri="{FF2B5EF4-FFF2-40B4-BE49-F238E27FC236}">
-                <a16:creationId xmlns:a16="http://schemas.microsoft.com/office/drawing/2014/main" id="{0E24183F-9031-9203-06BC-349BD75B40CA}"/>
+          <p:cNvPr id="74" name="직사각형 73">
+            <a:extLst>
+              <a:ext uri="{FF2B5EF4-FFF2-40B4-BE49-F238E27FC236}">
+                <a16:creationId xmlns:a16="http://schemas.microsoft.com/office/drawing/2014/main" id="{48A9B7C4-BC71-E475-8F04-072DD66A0505}"/>
+              </a:ext>
+            </a:extLst>
+          </p:cNvPr>
+          <p:cNvSpPr/>
+          <p:nvPr/>
+        </p:nvSpPr>
+        <p:spPr>
+          <a:xfrm>
+            <a:off x="2482733" y="1029720"/>
+            <a:ext cx="1353274" cy="731176"/>
+          </a:xfrm>
+          <a:prstGeom prst="rect">
+            <a:avLst/>
+          </a:prstGeom>
+          <a:noFill/>
+          <a:ln w="25400"/>
+        </p:spPr>
+        <p:style>
+          <a:lnRef idx="2">
+            <a:schemeClr val="dk1">
+              <a:shade val="50000"/>
+            </a:schemeClr>
+          </a:lnRef>
+          <a:fillRef idx="1">
+            <a:schemeClr val="dk1"/>
+          </a:fillRef>
+          <a:effectRef idx="0">
+            <a:schemeClr val="dk1"/>
+          </a:effectRef>
+          <a:fontRef idx="minor">
+            <a:schemeClr val="lt1"/>
+          </a:fontRef>
+        </p:style>
+        <p:txBody>
+          <a:bodyPr rtlCol="0" anchor="ctr"/>
+          <a:lstStyle/>
+          <a:p>
+            <a:pPr algn="ctr"/>
+            <a:r>
+              <a:rPr kumimoji="1" lang="en-US" altLang="en-US">
+                <a:solidFill>
+                  <a:schemeClr val="tx1"/>
+                </a:solidFill>
+              </a:rPr>
+              <a:t>JATG</a:t>
+            </a:r>
+            <a:endParaRPr kumimoji="1" lang="ko-Kore-KR" altLang="en-US" dirty="0">
+              <a:solidFill>
+                <a:schemeClr val="tx1"/>
+              </a:solidFill>
+            </a:endParaRPr>
+          </a:p>
+        </p:txBody>
+      </p:sp>
+      <p:sp>
+        <p:nvSpPr>
+          <p:cNvPr id="75" name="직사각형 74">
+            <a:extLst>
+              <a:ext uri="{FF2B5EF4-FFF2-40B4-BE49-F238E27FC236}">
+                <a16:creationId xmlns:a16="http://schemas.microsoft.com/office/drawing/2014/main" id="{D1A780B7-7EF7-6223-41EF-70775FBEDB34}"/>
+              </a:ext>
+            </a:extLst>
+          </p:cNvPr>
+          <p:cNvSpPr/>
+          <p:nvPr/>
+        </p:nvSpPr>
+        <p:spPr>
+          <a:xfrm>
+            <a:off x="9275103" y="1034857"/>
+            <a:ext cx="1353274" cy="731176"/>
+          </a:xfrm>
+          <a:prstGeom prst="rect">
+            <a:avLst/>
+          </a:prstGeom>
+          <a:noFill/>
+          <a:ln w="25400"/>
+        </p:spPr>
+        <p:style>
+          <a:lnRef idx="2">
+            <a:schemeClr val="dk1">
+              <a:shade val="50000"/>
+            </a:schemeClr>
+          </a:lnRef>
+          <a:fillRef idx="1">
+            <a:schemeClr val="dk1"/>
+          </a:fillRef>
+          <a:effectRef idx="0">
+            <a:schemeClr val="dk1"/>
+          </a:effectRef>
+          <a:fontRef idx="minor">
+            <a:schemeClr val="lt1"/>
+          </a:fontRef>
+        </p:style>
+        <p:txBody>
+          <a:bodyPr rtlCol="0" anchor="ctr"/>
+          <a:lstStyle/>
+          <a:p>
+            <a:pPr algn="ctr"/>
+            <a:r>
+              <a:rPr kumimoji="1" lang="en-US" altLang="en-US">
+                <a:solidFill>
+                  <a:schemeClr val="tx1"/>
+                </a:solidFill>
+              </a:rPr>
+              <a:t>regulator</a:t>
+            </a:r>
+            <a:endParaRPr kumimoji="1" lang="ko-Kore-KR" altLang="en-US" dirty="0">
+              <a:solidFill>
+                <a:schemeClr val="tx1"/>
+              </a:solidFill>
+            </a:endParaRPr>
+          </a:p>
+        </p:txBody>
+      </p:sp>
+      <p:cxnSp>
+        <p:nvCxnSpPr>
+          <p:cNvPr id="76" name="연결선: 꺾임 75">
+            <a:extLst>
+              <a:ext uri="{FF2B5EF4-FFF2-40B4-BE49-F238E27FC236}">
+                <a16:creationId xmlns:a16="http://schemas.microsoft.com/office/drawing/2014/main" id="{3F74A277-6158-BC59-4FB8-BC59483EDB53}"/>
+              </a:ext>
+            </a:extLst>
+          </p:cNvPr>
+          <p:cNvCxnSpPr>
+            <a:cxnSpLocks/>
+            <a:stCxn id="75" idx="2"/>
+            <a:endCxn id="4" idx="1"/>
+          </p:cNvCxnSpPr>
+          <p:nvPr/>
+        </p:nvCxnSpPr>
+        <p:spPr>
+          <a:xfrm rot="5400000">
+            <a:off x="7724501" y="1914954"/>
+            <a:ext cx="2376161" cy="2078319"/>
+          </a:xfrm>
+          <a:prstGeom prst="bentConnector3">
+            <a:avLst>
+              <a:gd name="adj1" fmla="val 82870"/>
+            </a:avLst>
+          </a:prstGeom>
+          <a:ln w="25400">
+            <a:tailEnd type="triangle"/>
+          </a:ln>
+        </p:spPr>
+        <p:style>
+          <a:lnRef idx="1">
+            <a:schemeClr val="dk1"/>
+          </a:lnRef>
+          <a:fillRef idx="0">
+            <a:schemeClr val="dk1"/>
+          </a:fillRef>
+          <a:effectRef idx="0">
+            <a:schemeClr val="dk1"/>
+          </a:effectRef>
+          <a:fontRef idx="minor">
+            <a:schemeClr val="tx1"/>
+          </a:fontRef>
+        </p:style>
+      </p:cxnSp>
+      <p:sp>
+        <p:nvSpPr>
+          <p:cNvPr id="83" name="TextBox 82">
+            <a:extLst>
+              <a:ext uri="{FF2B5EF4-FFF2-40B4-BE49-F238E27FC236}">
+                <a16:creationId xmlns:a16="http://schemas.microsoft.com/office/drawing/2014/main" id="{56A345CC-5DC4-C56B-07EF-C054670445D0}"/>
               </a:ext>
             </a:extLst>
           </p:cNvPr>
@@ -7637,8 +8658,8 @@
         </p:nvSpPr>
         <p:spPr>
           <a:xfrm>
-            <a:off x="4199167" y="4804055"/>
-            <a:ext cx="875916" cy="292388"/>
+            <a:off x="10095222" y="1956262"/>
+            <a:ext cx="622259" cy="369332"/>
           </a:xfrm>
           <a:prstGeom prst="rect">
             <a:avLst/>
@@ -7646,97 +8667,289 @@
           <a:noFill/>
         </p:spPr>
         <p:txBody>
-          <a:bodyPr wrap="square" rtlCol="0">
+          <a:bodyPr wrap="square">
             <a:spAutoFit/>
           </a:bodyPr>
           <a:lstStyle/>
           <a:p>
             <a:pPr algn="ctr"/>
             <a:r>
-              <a:rPr kumimoji="1" lang="en-US" altLang="ko-Kore-KR" sz="1300"/>
-              <a:t>RF SPDT</a:t>
-            </a:r>
-            <a:endParaRPr kumimoji="1" lang="ko-Kore-KR" altLang="en-US" sz="1300" dirty="0"/>
-          </a:p>
-        </p:txBody>
-      </p:sp>
-      <p:sp>
-        <p:nvSpPr>
-          <p:cNvPr id="55" name="TextBox 54">
-            <a:extLst>
-              <a:ext uri="{FF2B5EF4-FFF2-40B4-BE49-F238E27FC236}">
-                <a16:creationId xmlns:a16="http://schemas.microsoft.com/office/drawing/2014/main" id="{F158E427-4768-0967-18DB-0EC487444342}"/>
-              </a:ext>
-            </a:extLst>
-          </p:cNvPr>
-          <p:cNvSpPr txBox="1"/>
-          <p:nvPr/>
-        </p:nvSpPr>
-        <p:spPr>
-          <a:xfrm>
-            <a:off x="433449" y="694706"/>
-            <a:ext cx="1424493" cy="369332"/>
-          </a:xfrm>
-          <a:prstGeom prst="rect">
-            <a:avLst/>
-          </a:prstGeom>
-          <a:noFill/>
-        </p:spPr>
-        <p:txBody>
-          <a:bodyPr wrap="none" rtlCol="0">
-            <a:spAutoFit/>
-          </a:bodyPr>
-          <a:lstStyle/>
-          <a:p>
-            <a:r>
-              <a:rPr lang="en-US" altLang="ko-KR"/>
-              <a:t>DAC</a:t>
-            </a:r>
-            <a:r>
-              <a:rPr lang="ko-KR" altLang="en-US"/>
-              <a:t> </a:t>
-            </a:r>
-            <a:r>
-              <a:rPr lang="en-US" altLang="ko-KR"/>
-              <a:t>output</a:t>
+              <a:rPr kumimoji="1" lang="en-US" altLang="en-US" sz="1800"/>
+              <a:t>7V</a:t>
             </a:r>
             <a:endParaRPr lang="ko-KR" altLang="en-US"/>
           </a:p>
         </p:txBody>
       </p:sp>
-      <p:sp>
-        <p:nvSpPr>
-          <p:cNvPr id="56" name="직사각형 55">
-            <a:extLst>
-              <a:ext uri="{FF2B5EF4-FFF2-40B4-BE49-F238E27FC236}">
-                <a16:creationId xmlns:a16="http://schemas.microsoft.com/office/drawing/2014/main" id="{CCCA1A9D-3E08-9471-EB1D-97FC65DB1BB7}"/>
-              </a:ext>
-            </a:extLst>
-          </p:cNvPr>
-          <p:cNvSpPr/>
-          <p:nvPr/>
-        </p:nvSpPr>
-        <p:spPr>
-          <a:xfrm>
-            <a:off x="2660819" y="1457512"/>
-            <a:ext cx="6404683" cy="1210583"/>
-          </a:xfrm>
-          <a:prstGeom prst="rect">
-            <a:avLst/>
-          </a:prstGeom>
-          <a:solidFill>
-            <a:schemeClr val="accent3"/>
-          </a:solidFill>
-          <a:ln>
+      <p:cxnSp>
+        <p:nvCxnSpPr>
+          <p:cNvPr id="87" name="직선 연결선[R] 89">
+            <a:extLst>
+              <a:ext uri="{FF2B5EF4-FFF2-40B4-BE49-F238E27FC236}">
+                <a16:creationId xmlns:a16="http://schemas.microsoft.com/office/drawing/2014/main" id="{7F6FA9C9-C432-86E4-8AEA-4C67399CA9E8}"/>
+              </a:ext>
+            </a:extLst>
+          </p:cNvPr>
+          <p:cNvCxnSpPr>
+            <a:cxnSpLocks/>
+            <a:stCxn id="35" idx="1"/>
+          </p:cNvCxnSpPr>
+          <p:nvPr/>
+        </p:nvCxnSpPr>
+        <p:spPr>
+          <a:xfrm flipH="1">
+            <a:off x="5849938" y="4283445"/>
+            <a:ext cx="103550" cy="0"/>
+          </a:xfrm>
+          <a:prstGeom prst="line">
+            <a:avLst/>
+          </a:prstGeom>
+          <a:ln w="25400">
             <a:solidFill>
               <a:schemeClr val="tx1"/>
             </a:solidFill>
           </a:ln>
         </p:spPr>
         <p:style>
+          <a:lnRef idx="1">
+            <a:schemeClr val="dk1"/>
+          </a:lnRef>
+          <a:fillRef idx="0">
+            <a:schemeClr val="dk1"/>
+          </a:fillRef>
+          <a:effectRef idx="0">
+            <a:schemeClr val="dk1"/>
+          </a:effectRef>
+          <a:fontRef idx="minor">
+            <a:schemeClr val="tx1"/>
+          </a:fontRef>
+        </p:style>
+      </p:cxnSp>
+      <p:cxnSp>
+        <p:nvCxnSpPr>
+          <p:cNvPr id="90" name="직선 연결선[R] 117">
+            <a:extLst>
+              <a:ext uri="{FF2B5EF4-FFF2-40B4-BE49-F238E27FC236}">
+                <a16:creationId xmlns:a16="http://schemas.microsoft.com/office/drawing/2014/main" id="{B1EAFF41-36AD-1F20-5472-ADC29636C151}"/>
+              </a:ext>
+            </a:extLst>
+          </p:cNvPr>
+          <p:cNvCxnSpPr>
+            <a:cxnSpLocks/>
+            <a:stCxn id="10" idx="1"/>
+          </p:cNvCxnSpPr>
+          <p:nvPr/>
+        </p:nvCxnSpPr>
+        <p:spPr>
+          <a:xfrm flipH="1">
+            <a:off x="6713538" y="4284057"/>
+            <a:ext cx="81686" cy="0"/>
+          </a:xfrm>
+          <a:prstGeom prst="line">
+            <a:avLst/>
+          </a:prstGeom>
+          <a:ln w="25400">
+            <a:solidFill>
+              <a:schemeClr val="tx1"/>
+            </a:solidFill>
+          </a:ln>
+        </p:spPr>
+        <p:style>
+          <a:lnRef idx="1">
+            <a:schemeClr val="dk1"/>
+          </a:lnRef>
+          <a:fillRef idx="0">
+            <a:schemeClr val="dk1"/>
+          </a:fillRef>
+          <a:effectRef idx="0">
+            <a:schemeClr val="dk1"/>
+          </a:effectRef>
+          <a:fontRef idx="minor">
+            <a:schemeClr val="tx1"/>
+          </a:fontRef>
+        </p:style>
+      </p:cxnSp>
+      <p:cxnSp>
+        <p:nvCxnSpPr>
+          <p:cNvPr id="96" name="직선 연결선 95">
+            <a:extLst>
+              <a:ext uri="{FF2B5EF4-FFF2-40B4-BE49-F238E27FC236}">
+                <a16:creationId xmlns:a16="http://schemas.microsoft.com/office/drawing/2014/main" id="{FDACE928-52F1-F4DE-B9BA-95284FE7AFB2}"/>
+              </a:ext>
+            </a:extLst>
+          </p:cNvPr>
+          <p:cNvCxnSpPr/>
+          <p:nvPr/>
+        </p:nvCxnSpPr>
+        <p:spPr>
+          <a:xfrm>
+            <a:off x="5776913" y="4142194"/>
+            <a:ext cx="0" cy="264792"/>
+          </a:xfrm>
+          <a:prstGeom prst="line">
+            <a:avLst/>
+          </a:prstGeom>
+          <a:ln w="12700"/>
+        </p:spPr>
+        <p:style>
+          <a:lnRef idx="1">
+            <a:schemeClr val="dk1"/>
+          </a:lnRef>
+          <a:fillRef idx="0">
+            <a:schemeClr val="dk1"/>
+          </a:fillRef>
+          <a:effectRef idx="0">
+            <a:schemeClr val="dk1"/>
+          </a:effectRef>
+          <a:fontRef idx="minor">
+            <a:schemeClr val="tx1"/>
+          </a:fontRef>
+        </p:style>
+      </p:cxnSp>
+      <p:cxnSp>
+        <p:nvCxnSpPr>
+          <p:cNvPr id="98" name="직선 연결선 97">
+            <a:extLst>
+              <a:ext uri="{FF2B5EF4-FFF2-40B4-BE49-F238E27FC236}">
+                <a16:creationId xmlns:a16="http://schemas.microsoft.com/office/drawing/2014/main" id="{F33F9930-C984-1FB1-3CD5-85CE9413A3AF}"/>
+              </a:ext>
+            </a:extLst>
+          </p:cNvPr>
+          <p:cNvCxnSpPr/>
+          <p:nvPr/>
+        </p:nvCxnSpPr>
+        <p:spPr>
+          <a:xfrm>
+            <a:off x="5849938" y="4142194"/>
+            <a:ext cx="0" cy="264792"/>
+          </a:xfrm>
+          <a:prstGeom prst="line">
+            <a:avLst/>
+          </a:prstGeom>
+          <a:ln w="12700"/>
+        </p:spPr>
+        <p:style>
+          <a:lnRef idx="1">
+            <a:schemeClr val="dk1"/>
+          </a:lnRef>
+          <a:fillRef idx="0">
+            <a:schemeClr val="dk1"/>
+          </a:fillRef>
+          <a:effectRef idx="0">
+            <a:schemeClr val="dk1"/>
+          </a:effectRef>
+          <a:fontRef idx="minor">
+            <a:schemeClr val="tx1"/>
+          </a:fontRef>
+        </p:style>
+      </p:cxnSp>
+      <p:cxnSp>
+        <p:nvCxnSpPr>
+          <p:cNvPr id="99" name="직선 연결선 98">
+            <a:extLst>
+              <a:ext uri="{FF2B5EF4-FFF2-40B4-BE49-F238E27FC236}">
+                <a16:creationId xmlns:a16="http://schemas.microsoft.com/office/drawing/2014/main" id="{C8B64DFA-C0E0-8B7A-20A3-ADCBB53731AA}"/>
+              </a:ext>
+            </a:extLst>
+          </p:cNvPr>
+          <p:cNvCxnSpPr/>
+          <p:nvPr/>
+        </p:nvCxnSpPr>
+        <p:spPr>
+          <a:xfrm>
+            <a:off x="6640513" y="4142194"/>
+            <a:ext cx="0" cy="264792"/>
+          </a:xfrm>
+          <a:prstGeom prst="line">
+            <a:avLst/>
+          </a:prstGeom>
+          <a:ln w="12700"/>
+        </p:spPr>
+        <p:style>
+          <a:lnRef idx="1">
+            <a:schemeClr val="dk1"/>
+          </a:lnRef>
+          <a:fillRef idx="0">
+            <a:schemeClr val="dk1"/>
+          </a:fillRef>
+          <a:effectRef idx="0">
+            <a:schemeClr val="dk1"/>
+          </a:effectRef>
+          <a:fontRef idx="minor">
+            <a:schemeClr val="tx1"/>
+          </a:fontRef>
+        </p:style>
+      </p:cxnSp>
+      <p:cxnSp>
+        <p:nvCxnSpPr>
+          <p:cNvPr id="100" name="직선 연결선 99">
+            <a:extLst>
+              <a:ext uri="{FF2B5EF4-FFF2-40B4-BE49-F238E27FC236}">
+                <a16:creationId xmlns:a16="http://schemas.microsoft.com/office/drawing/2014/main" id="{4AE4EB0D-9BE8-B714-BF42-E56EFFBA3B77}"/>
+              </a:ext>
+            </a:extLst>
+          </p:cNvPr>
+          <p:cNvCxnSpPr/>
+          <p:nvPr/>
+        </p:nvCxnSpPr>
+        <p:spPr>
+          <a:xfrm>
+            <a:off x="6713538" y="4142194"/>
+            <a:ext cx="0" cy="264792"/>
+          </a:xfrm>
+          <a:prstGeom prst="line">
+            <a:avLst/>
+          </a:prstGeom>
+          <a:ln w="12700"/>
+        </p:spPr>
+        <p:style>
+          <a:lnRef idx="1">
+            <a:schemeClr val="dk1"/>
+          </a:lnRef>
+          <a:fillRef idx="0">
+            <a:schemeClr val="dk1"/>
+          </a:fillRef>
+          <a:effectRef idx="0">
+            <a:schemeClr val="dk1"/>
+          </a:effectRef>
+          <a:fontRef idx="minor">
+            <a:schemeClr val="tx1"/>
+          </a:fontRef>
+        </p:style>
+      </p:cxnSp>
+      <p:sp>
+        <p:nvSpPr>
+          <p:cNvPr id="108" name="아래쪽 화살표[D] 127">
+            <a:extLst>
+              <a:ext uri="{FF2B5EF4-FFF2-40B4-BE49-F238E27FC236}">
+                <a16:creationId xmlns:a16="http://schemas.microsoft.com/office/drawing/2014/main" id="{EE1BF614-93DF-982A-5567-8B857F4E5B18}"/>
+              </a:ext>
+            </a:extLst>
+          </p:cNvPr>
+          <p:cNvSpPr/>
+          <p:nvPr/>
+        </p:nvSpPr>
+        <p:spPr>
+          <a:xfrm rot="16200000">
+            <a:off x="4105077" y="1145306"/>
+            <a:ext cx="56727" cy="534714"/>
+          </a:xfrm>
+          <a:prstGeom prst="downArrow">
+            <a:avLst/>
+          </a:prstGeom>
+          <a:solidFill>
+            <a:schemeClr val="tx1"/>
+          </a:solidFill>
+          <a:ln w="25400">
+            <a:solidFill>
+              <a:schemeClr val="tx1"/>
+            </a:solidFill>
+          </a:ln>
+        </p:spPr>
+        <p:style>
           <a:lnRef idx="2">
             <a:schemeClr val="accent1">
-              <a:shade val="15000"/>
+              <a:shade val="50000"/>
             </a:schemeClr>
           </a:lnRef>
           <a:fillRef idx="1">
@@ -7754,20 +8967,16 @@
           <a:lstStyle/>
           <a:p>
             <a:pPr algn="ctr"/>
-            <a:r>
-              <a:rPr lang="en-US" altLang="ko-KR"/>
-              <a:t>Digital IO</a:t>
-            </a:r>
-            <a:endParaRPr lang="ko-KR" altLang="en-US"/>
-          </a:p>
-        </p:txBody>
-      </p:sp>
-      <p:sp>
-        <p:nvSpPr>
-          <p:cNvPr id="63" name="TextBox 62">
-            <a:extLst>
-              <a:ext uri="{FF2B5EF4-FFF2-40B4-BE49-F238E27FC236}">
-                <a16:creationId xmlns:a16="http://schemas.microsoft.com/office/drawing/2014/main" id="{0B8EC698-4380-CEE5-22A4-1C8347F7F478}"/>
+            <a:endParaRPr kumimoji="1" lang="ko-Kore-KR" altLang="en-US" dirty="0"/>
+          </a:p>
+        </p:txBody>
+      </p:sp>
+      <p:sp>
+        <p:nvSpPr>
+          <p:cNvPr id="111" name="TextBox 110">
+            <a:extLst>
+              <a:ext uri="{FF2B5EF4-FFF2-40B4-BE49-F238E27FC236}">
+                <a16:creationId xmlns:a16="http://schemas.microsoft.com/office/drawing/2014/main" id="{C065E164-CCAE-FF02-C642-62F7B17FDAD4}"/>
               </a:ext>
             </a:extLst>
           </p:cNvPr>
@@ -7776,8 +8985,8 @@
         </p:nvSpPr>
         <p:spPr>
           <a:xfrm>
-            <a:off x="6229055" y="3054627"/>
-            <a:ext cx="2154556" cy="369332"/>
+            <a:off x="10095222" y="438690"/>
+            <a:ext cx="622259" cy="369332"/>
           </a:xfrm>
           <a:prstGeom prst="rect">
             <a:avLst/>
@@ -7792,47 +9001,108 @@
           <a:p>
             <a:pPr algn="ctr"/>
             <a:r>
+              <a:rPr kumimoji="1" lang="en-US" altLang="en-US" sz="1800"/>
+              <a:t>12V</a:t>
+            </a:r>
+            <a:endParaRPr lang="ko-KR" altLang="en-US"/>
+          </a:p>
+        </p:txBody>
+      </p:sp>
+      <p:sp>
+        <p:nvSpPr>
+          <p:cNvPr id="112" name="아래쪽 화살표[D] 127">
+            <a:extLst>
+              <a:ext uri="{FF2B5EF4-FFF2-40B4-BE49-F238E27FC236}">
+                <a16:creationId xmlns:a16="http://schemas.microsoft.com/office/drawing/2014/main" id="{56603FC2-B127-341C-239C-0D0485EFF0E8}"/>
+              </a:ext>
+            </a:extLst>
+          </p:cNvPr>
+          <p:cNvSpPr/>
+          <p:nvPr/>
+        </p:nvSpPr>
+        <p:spPr>
+          <a:xfrm>
+            <a:off x="9916119" y="677908"/>
+            <a:ext cx="71241" cy="297296"/>
+          </a:xfrm>
+          <a:prstGeom prst="downArrow">
+            <a:avLst/>
+          </a:prstGeom>
+          <a:solidFill>
+            <a:schemeClr val="tx1"/>
+          </a:solidFill>
+          <a:ln w="25400">
+            <a:solidFill>
+              <a:schemeClr val="tx1"/>
+            </a:solidFill>
+          </a:ln>
+        </p:spPr>
+        <p:style>
+          <a:lnRef idx="2">
+            <a:schemeClr val="accent1">
+              <a:shade val="50000"/>
+            </a:schemeClr>
+          </a:lnRef>
+          <a:fillRef idx="1">
+            <a:schemeClr val="accent1"/>
+          </a:fillRef>
+          <a:effectRef idx="0">
+            <a:schemeClr val="accent1"/>
+          </a:effectRef>
+          <a:fontRef idx="minor">
+            <a:schemeClr val="lt1"/>
+          </a:fontRef>
+        </p:style>
+        <p:txBody>
+          <a:bodyPr rtlCol="0" anchor="ctr"/>
+          <a:lstStyle/>
+          <a:p>
+            <a:pPr algn="ctr"/>
+            <a:endParaRPr kumimoji="1" lang="ko-Kore-KR" altLang="en-US" dirty="0"/>
+          </a:p>
+        </p:txBody>
+      </p:sp>
+      <p:sp>
+        <p:nvSpPr>
+          <p:cNvPr id="114" name="TextBox 113">
+            <a:extLst>
+              <a:ext uri="{FF2B5EF4-FFF2-40B4-BE49-F238E27FC236}">
+                <a16:creationId xmlns:a16="http://schemas.microsoft.com/office/drawing/2014/main" id="{AB1701BA-8318-D0D9-3C3D-68C4829BFF2A}"/>
+              </a:ext>
+            </a:extLst>
+          </p:cNvPr>
+          <p:cNvSpPr txBox="1"/>
+          <p:nvPr/>
+        </p:nvSpPr>
+        <p:spPr>
+          <a:xfrm>
+            <a:off x="6397121" y="1164562"/>
+            <a:ext cx="1983931" cy="1200329"/>
+          </a:xfrm>
+          <a:prstGeom prst="rect">
+            <a:avLst/>
+          </a:prstGeom>
+          <a:noFill/>
+        </p:spPr>
+        <p:txBody>
+          <a:bodyPr wrap="square">
+            <a:spAutoFit/>
+          </a:bodyPr>
+          <a:lstStyle/>
+          <a:p>
+            <a:pPr algn="ctr"/>
+            <a:r>
               <a:rPr lang="en-US" altLang="ko-KR" sz="1800" i="0">
                 <a:effectLst/>
               </a:rPr>
-              <a:t>PAT1220-C-9DB-T5</a:t>
-            </a:r>
-            <a:endParaRPr lang="ko-KR" altLang="en-US"/>
-          </a:p>
-        </p:txBody>
-      </p:sp>
-      <p:sp>
-        <p:nvSpPr>
-          <p:cNvPr id="65" name="TextBox 64">
-            <a:extLst>
-              <a:ext uri="{FF2B5EF4-FFF2-40B4-BE49-F238E27FC236}">
-                <a16:creationId xmlns:a16="http://schemas.microsoft.com/office/drawing/2014/main" id="{C8DB26B4-973A-8602-480C-579F69AEE790}"/>
-              </a:ext>
-            </a:extLst>
-          </p:cNvPr>
-          <p:cNvSpPr txBox="1"/>
-          <p:nvPr/>
-        </p:nvSpPr>
-        <p:spPr>
-          <a:xfrm>
-            <a:off x="8544583" y="3041686"/>
-            <a:ext cx="1332545" cy="369332"/>
-          </a:xfrm>
-          <a:prstGeom prst="rect">
-            <a:avLst/>
-          </a:prstGeom>
-          <a:noFill/>
-        </p:spPr>
-        <p:txBody>
-          <a:bodyPr wrap="square">
-            <a:spAutoFit/>
-          </a:bodyPr>
-          <a:lstStyle/>
+              <a:t>has 80pins</a:t>
+            </a:r>
+          </a:p>
           <a:p>
             <a:pPr algn="ctr"/>
             <a:r>
-              <a:rPr kumimoji="1" lang="en-US" altLang="en-US" sz="1800"/>
-              <a:t>ERA-3SM+ </a:t>
+              <a:rPr lang="en-US" altLang="ko-KR"/>
+              <a:t>CPLD reamins data after powre down</a:t>
             </a:r>
             <a:endParaRPr lang="ko-KR" altLang="en-US"/>
           </a:p>
@@ -7840,29 +9110,30 @@
       </p:sp>
       <p:cxnSp>
         <p:nvCxnSpPr>
-          <p:cNvPr id="67" name="직선 연결선 66">
-            <a:extLst>
-              <a:ext uri="{FF2B5EF4-FFF2-40B4-BE49-F238E27FC236}">
-                <a16:creationId xmlns:a16="http://schemas.microsoft.com/office/drawing/2014/main" id="{1C0DE481-3BA8-5133-C25A-5A56EA16280A}"/>
+          <p:cNvPr id="115" name="직선 연결선[R] 117">
+            <a:extLst>
+              <a:ext uri="{FF2B5EF4-FFF2-40B4-BE49-F238E27FC236}">
+                <a16:creationId xmlns:a16="http://schemas.microsoft.com/office/drawing/2014/main" id="{40877C0D-F736-B077-3F29-269786288F01}"/>
               </a:ext>
             </a:extLst>
           </p:cNvPr>
           <p:cNvCxnSpPr>
-            <a:stCxn id="10" idx="0"/>
-            <a:endCxn id="63" idx="2"/>
+            <a:cxnSpLocks/>
           </p:cNvCxnSpPr>
           <p:nvPr/>
         </p:nvCxnSpPr>
         <p:spPr>
-          <a:xfrm flipV="1">
-            <a:off x="7105771" y="3423959"/>
-            <a:ext cx="200562" cy="549551"/>
+          <a:xfrm flipH="1">
+            <a:off x="7429389" y="4283445"/>
+            <a:ext cx="65932" cy="0"/>
           </a:xfrm>
           <a:prstGeom prst="line">
             <a:avLst/>
           </a:prstGeom>
-          <a:ln w="19050">
-            <a:prstDash val="lgDash"/>
+          <a:ln w="25400">
+            <a:solidFill>
+              <a:schemeClr val="tx1"/>
+            </a:solidFill>
           </a:ln>
         </p:spPr>
         <p:style>
@@ -7882,30 +9153,30 @@
       </p:cxnSp>
       <p:cxnSp>
         <p:nvCxnSpPr>
-          <p:cNvPr id="68" name="직선 연결선 67">
-            <a:extLst>
-              <a:ext uri="{FF2B5EF4-FFF2-40B4-BE49-F238E27FC236}">
-                <a16:creationId xmlns:a16="http://schemas.microsoft.com/office/drawing/2014/main" id="{C9543972-CC59-38BB-5397-A5A3599AF430}"/>
+          <p:cNvPr id="116" name="직선 연결선[R] 117">
+            <a:extLst>
+              <a:ext uri="{FF2B5EF4-FFF2-40B4-BE49-F238E27FC236}">
+                <a16:creationId xmlns:a16="http://schemas.microsoft.com/office/drawing/2014/main" id="{F63FE9AD-F5D8-947B-1D71-262DE4C5277E}"/>
               </a:ext>
             </a:extLst>
           </p:cNvPr>
           <p:cNvCxnSpPr>
             <a:cxnSpLocks/>
-            <a:stCxn id="4" idx="1"/>
-            <a:endCxn id="65" idx="2"/>
           </p:cNvCxnSpPr>
           <p:nvPr/>
         </p:nvCxnSpPr>
         <p:spPr>
-          <a:xfrm flipV="1">
-            <a:off x="7790148" y="3411018"/>
-            <a:ext cx="1420708" cy="731176"/>
+          <a:xfrm flipH="1">
+            <a:off x="7568346" y="4284057"/>
+            <a:ext cx="81686" cy="0"/>
           </a:xfrm>
           <a:prstGeom prst="line">
             <a:avLst/>
           </a:prstGeom>
-          <a:ln w="19050">
-            <a:prstDash val="lgDash"/>
+          <a:ln w="25400">
+            <a:solidFill>
+              <a:schemeClr val="tx1"/>
+            </a:solidFill>
           </a:ln>
         </p:spPr>
         <p:style>
@@ -7923,72 +9194,27 @@
           </a:fontRef>
         </p:style>
       </p:cxnSp>
-      <p:sp>
-        <p:nvSpPr>
-          <p:cNvPr id="71" name="TextBox 70">
-            <a:extLst>
-              <a:ext uri="{FF2B5EF4-FFF2-40B4-BE49-F238E27FC236}">
-                <a16:creationId xmlns:a16="http://schemas.microsoft.com/office/drawing/2014/main" id="{9F0E31F0-0209-07AF-029B-C66C3EFA5533}"/>
-              </a:ext>
-            </a:extLst>
-          </p:cNvPr>
-          <p:cNvSpPr txBox="1"/>
-          <p:nvPr/>
-        </p:nvSpPr>
-        <p:spPr>
-          <a:xfrm>
-            <a:off x="4604242" y="3054627"/>
-            <a:ext cx="1597156" cy="369332"/>
-          </a:xfrm>
-          <a:prstGeom prst="rect">
-            <a:avLst/>
-          </a:prstGeom>
-          <a:noFill/>
-        </p:spPr>
-        <p:txBody>
-          <a:bodyPr wrap="square">
-            <a:spAutoFit/>
-          </a:bodyPr>
-          <a:lstStyle/>
-          <a:p>
-            <a:pPr algn="ctr"/>
-            <a:r>
-              <a:rPr lang="en-US" altLang="ko-KR" sz="1800" i="0">
-                <a:effectLst/>
-              </a:rPr>
-              <a:t>Eliptical filter</a:t>
-            </a:r>
-            <a:endParaRPr lang="ko-KR" altLang="en-US"/>
-          </a:p>
-        </p:txBody>
-      </p:sp>
       <p:cxnSp>
         <p:nvCxnSpPr>
-          <p:cNvPr id="72" name="직선 연결선 71">
-            <a:extLst>
-              <a:ext uri="{FF2B5EF4-FFF2-40B4-BE49-F238E27FC236}">
-                <a16:creationId xmlns:a16="http://schemas.microsoft.com/office/drawing/2014/main" id="{2BA12069-7DCA-7D8D-5E40-FB2B9CE44E8A}"/>
-              </a:ext>
-            </a:extLst>
-          </p:cNvPr>
-          <p:cNvCxnSpPr>
-            <a:cxnSpLocks/>
-            <a:stCxn id="6" idx="0"/>
-            <a:endCxn id="71" idx="2"/>
-          </p:cNvCxnSpPr>
+          <p:cNvPr id="117" name="직선 연결선 116">
+            <a:extLst>
+              <a:ext uri="{FF2B5EF4-FFF2-40B4-BE49-F238E27FC236}">
+                <a16:creationId xmlns:a16="http://schemas.microsoft.com/office/drawing/2014/main" id="{01AC8B2F-373C-8448-6458-92ACFF90F33E}"/>
+              </a:ext>
+            </a:extLst>
+          </p:cNvPr>
+          <p:cNvCxnSpPr/>
           <p:nvPr/>
         </p:nvCxnSpPr>
         <p:spPr>
-          <a:xfrm flipV="1">
-            <a:off x="5376743" y="3423959"/>
-            <a:ext cx="26077" cy="548939"/>
+          <a:xfrm>
+            <a:off x="7495321" y="4142194"/>
+            <a:ext cx="0" cy="264792"/>
           </a:xfrm>
           <a:prstGeom prst="line">
             <a:avLst/>
           </a:prstGeom>
-          <a:ln w="19050">
-            <a:prstDash val="lgDash"/>
-          </a:ln>
+          <a:ln w="12700"/>
         </p:spPr>
         <p:style>
           <a:lnRef idx="1">
@@ -8005,72 +9231,27 @@
           </a:fontRef>
         </p:style>
       </p:cxnSp>
-      <p:sp>
-        <p:nvSpPr>
-          <p:cNvPr id="77" name="TextBox 76">
-            <a:extLst>
-              <a:ext uri="{FF2B5EF4-FFF2-40B4-BE49-F238E27FC236}">
-                <a16:creationId xmlns:a16="http://schemas.microsoft.com/office/drawing/2014/main" id="{A897D51F-BF9D-FBAB-0F0F-69F1B253F5E3}"/>
-              </a:ext>
-            </a:extLst>
-          </p:cNvPr>
-          <p:cNvSpPr txBox="1"/>
-          <p:nvPr/>
-        </p:nvSpPr>
-        <p:spPr>
-          <a:xfrm>
-            <a:off x="2874933" y="3054627"/>
-            <a:ext cx="1597156" cy="369332"/>
-          </a:xfrm>
-          <a:prstGeom prst="rect">
-            <a:avLst/>
-          </a:prstGeom>
-          <a:noFill/>
-        </p:spPr>
-        <p:txBody>
-          <a:bodyPr wrap="square">
-            <a:spAutoFit/>
-          </a:bodyPr>
-          <a:lstStyle/>
-          <a:p>
-            <a:pPr algn="ctr"/>
-            <a:r>
-              <a:rPr lang="en-US" altLang="ko-KR" sz="1800" i="0">
-                <a:effectLst/>
-              </a:rPr>
-              <a:t>TC2-72T+</a:t>
-            </a:r>
-            <a:endParaRPr lang="ko-KR" altLang="en-US"/>
-          </a:p>
-        </p:txBody>
-      </p:sp>
       <p:cxnSp>
         <p:nvCxnSpPr>
-          <p:cNvPr id="78" name="직선 연결선 77">
-            <a:extLst>
-              <a:ext uri="{FF2B5EF4-FFF2-40B4-BE49-F238E27FC236}">
-                <a16:creationId xmlns:a16="http://schemas.microsoft.com/office/drawing/2014/main" id="{3F47FBC5-D47D-96C3-062A-7F9975F38C28}"/>
-              </a:ext>
-            </a:extLst>
-          </p:cNvPr>
-          <p:cNvCxnSpPr>
-            <a:cxnSpLocks/>
-            <a:stCxn id="15" idx="0"/>
-            <a:endCxn id="77" idx="2"/>
-          </p:cNvCxnSpPr>
+          <p:cNvPr id="118" name="직선 연결선 117">
+            <a:extLst>
+              <a:ext uri="{FF2B5EF4-FFF2-40B4-BE49-F238E27FC236}">
+                <a16:creationId xmlns:a16="http://schemas.microsoft.com/office/drawing/2014/main" id="{AE112570-D401-96D9-1227-2AE523450CB3}"/>
+              </a:ext>
+            </a:extLst>
+          </p:cNvPr>
+          <p:cNvCxnSpPr/>
           <p:nvPr/>
         </p:nvCxnSpPr>
         <p:spPr>
-          <a:xfrm flipH="1" flipV="1">
-            <a:off x="3673511" y="3423959"/>
-            <a:ext cx="274730" cy="725784"/>
+          <a:xfrm>
+            <a:off x="7568346" y="4142194"/>
+            <a:ext cx="0" cy="264792"/>
           </a:xfrm>
           <a:prstGeom prst="line">
             <a:avLst/>
           </a:prstGeom>
-          <a:ln w="19050">
-            <a:prstDash val="lgDash"/>
-          </a:ln>
+          <a:ln w="12700"/>
         </p:spPr>
         <p:style>
           <a:lnRef idx="1">
@@ -8087,12 +9268,215 @@
           </a:fontRef>
         </p:style>
       </p:cxnSp>
-      <p:sp>
-        <p:nvSpPr>
-          <p:cNvPr id="85" name="TextBox 84">
-            <a:extLst>
-              <a:ext uri="{FF2B5EF4-FFF2-40B4-BE49-F238E27FC236}">
-                <a16:creationId xmlns:a16="http://schemas.microsoft.com/office/drawing/2014/main" id="{B5FDF0A2-7BFA-0D58-374B-3F3178B85068}"/>
+      <p:cxnSp>
+        <p:nvCxnSpPr>
+          <p:cNvPr id="125" name="직선 연결선[R] 117">
+            <a:extLst>
+              <a:ext uri="{FF2B5EF4-FFF2-40B4-BE49-F238E27FC236}">
+                <a16:creationId xmlns:a16="http://schemas.microsoft.com/office/drawing/2014/main" id="{55B72F5E-F9EB-4550-EF51-AEFBA0D20CAB}"/>
+              </a:ext>
+            </a:extLst>
+          </p:cNvPr>
+          <p:cNvCxnSpPr>
+            <a:cxnSpLocks/>
+          </p:cNvCxnSpPr>
+          <p:nvPr/>
+        </p:nvCxnSpPr>
+        <p:spPr>
+          <a:xfrm flipH="1">
+            <a:off x="8108294" y="4283445"/>
+            <a:ext cx="65932" cy="0"/>
+          </a:xfrm>
+          <a:prstGeom prst="line">
+            <a:avLst/>
+          </a:prstGeom>
+          <a:ln w="25400">
+            <a:solidFill>
+              <a:schemeClr val="tx1"/>
+            </a:solidFill>
+          </a:ln>
+        </p:spPr>
+        <p:style>
+          <a:lnRef idx="1">
+            <a:schemeClr val="dk1"/>
+          </a:lnRef>
+          <a:fillRef idx="0">
+            <a:schemeClr val="dk1"/>
+          </a:fillRef>
+          <a:effectRef idx="0">
+            <a:schemeClr val="dk1"/>
+          </a:effectRef>
+          <a:fontRef idx="minor">
+            <a:schemeClr val="tx1"/>
+          </a:fontRef>
+        </p:style>
+      </p:cxnSp>
+      <p:cxnSp>
+        <p:nvCxnSpPr>
+          <p:cNvPr id="126" name="직선 연결선[R] 117">
+            <a:extLst>
+              <a:ext uri="{FF2B5EF4-FFF2-40B4-BE49-F238E27FC236}">
+                <a16:creationId xmlns:a16="http://schemas.microsoft.com/office/drawing/2014/main" id="{0BAF5226-A736-D048-9FDA-1AAD2723ED1B}"/>
+              </a:ext>
+            </a:extLst>
+          </p:cNvPr>
+          <p:cNvCxnSpPr>
+            <a:cxnSpLocks/>
+          </p:cNvCxnSpPr>
+          <p:nvPr/>
+        </p:nvCxnSpPr>
+        <p:spPr>
+          <a:xfrm flipH="1">
+            <a:off x="8247251" y="4284057"/>
+            <a:ext cx="81686" cy="0"/>
+          </a:xfrm>
+          <a:prstGeom prst="line">
+            <a:avLst/>
+          </a:prstGeom>
+          <a:ln w="25400">
+            <a:solidFill>
+              <a:schemeClr val="tx1"/>
+            </a:solidFill>
+          </a:ln>
+        </p:spPr>
+        <p:style>
+          <a:lnRef idx="1">
+            <a:schemeClr val="dk1"/>
+          </a:lnRef>
+          <a:fillRef idx="0">
+            <a:schemeClr val="dk1"/>
+          </a:fillRef>
+          <a:effectRef idx="0">
+            <a:schemeClr val="dk1"/>
+          </a:effectRef>
+          <a:fontRef idx="minor">
+            <a:schemeClr val="tx1"/>
+          </a:fontRef>
+        </p:style>
+      </p:cxnSp>
+      <p:cxnSp>
+        <p:nvCxnSpPr>
+          <p:cNvPr id="127" name="직선 연결선 126">
+            <a:extLst>
+              <a:ext uri="{FF2B5EF4-FFF2-40B4-BE49-F238E27FC236}">
+                <a16:creationId xmlns:a16="http://schemas.microsoft.com/office/drawing/2014/main" id="{E5BC80F0-C254-0469-7E97-DC4F402789D1}"/>
+              </a:ext>
+            </a:extLst>
+          </p:cNvPr>
+          <p:cNvCxnSpPr/>
+          <p:nvPr/>
+        </p:nvCxnSpPr>
+        <p:spPr>
+          <a:xfrm>
+            <a:off x="8174226" y="4142194"/>
+            <a:ext cx="0" cy="264792"/>
+          </a:xfrm>
+          <a:prstGeom prst="line">
+            <a:avLst/>
+          </a:prstGeom>
+          <a:ln w="12700"/>
+        </p:spPr>
+        <p:style>
+          <a:lnRef idx="1">
+            <a:schemeClr val="dk1"/>
+          </a:lnRef>
+          <a:fillRef idx="0">
+            <a:schemeClr val="dk1"/>
+          </a:fillRef>
+          <a:effectRef idx="0">
+            <a:schemeClr val="dk1"/>
+          </a:effectRef>
+          <a:fontRef idx="minor">
+            <a:schemeClr val="tx1"/>
+          </a:fontRef>
+        </p:style>
+      </p:cxnSp>
+      <p:cxnSp>
+        <p:nvCxnSpPr>
+          <p:cNvPr id="128" name="직선 연결선 127">
+            <a:extLst>
+              <a:ext uri="{FF2B5EF4-FFF2-40B4-BE49-F238E27FC236}">
+                <a16:creationId xmlns:a16="http://schemas.microsoft.com/office/drawing/2014/main" id="{4E46308D-258B-E89C-A5C5-2DC4EB747078}"/>
+              </a:ext>
+            </a:extLst>
+          </p:cNvPr>
+          <p:cNvCxnSpPr/>
+          <p:nvPr/>
+        </p:nvCxnSpPr>
+        <p:spPr>
+          <a:xfrm>
+            <a:off x="8247251" y="4142194"/>
+            <a:ext cx="0" cy="264792"/>
+          </a:xfrm>
+          <a:prstGeom prst="line">
+            <a:avLst/>
+          </a:prstGeom>
+          <a:ln w="12700"/>
+        </p:spPr>
+        <p:style>
+          <a:lnRef idx="1">
+            <a:schemeClr val="dk1"/>
+          </a:lnRef>
+          <a:fillRef idx="0">
+            <a:schemeClr val="dk1"/>
+          </a:fillRef>
+          <a:effectRef idx="0">
+            <a:schemeClr val="dk1"/>
+          </a:effectRef>
+          <a:fontRef idx="minor">
+            <a:schemeClr val="tx1"/>
+          </a:fontRef>
+        </p:style>
+      </p:cxnSp>
+      <p:cxnSp>
+        <p:nvCxnSpPr>
+          <p:cNvPr id="131" name="연결선: 꺾임 130">
+            <a:extLst>
+              <a:ext uri="{FF2B5EF4-FFF2-40B4-BE49-F238E27FC236}">
+                <a16:creationId xmlns:a16="http://schemas.microsoft.com/office/drawing/2014/main" id="{AB9D781E-5A4D-A81F-AD72-5E9BDA8E0998}"/>
+              </a:ext>
+            </a:extLst>
+          </p:cNvPr>
+          <p:cNvCxnSpPr>
+            <a:cxnSpLocks/>
+            <a:stCxn id="43" idx="0"/>
+            <a:endCxn id="3" idx="1"/>
+          </p:cNvCxnSpPr>
+          <p:nvPr/>
+        </p:nvCxnSpPr>
+        <p:spPr>
+          <a:xfrm rot="5400000" flipH="1" flipV="1">
+            <a:off x="2865185" y="1627559"/>
+            <a:ext cx="1382331" cy="1780845"/>
+          </a:xfrm>
+          <a:prstGeom prst="bentConnector2">
+            <a:avLst/>
+          </a:prstGeom>
+          <a:ln w="25400">
+            <a:tailEnd type="triangle"/>
+          </a:ln>
+        </p:spPr>
+        <p:style>
+          <a:lnRef idx="1">
+            <a:schemeClr val="dk1"/>
+          </a:lnRef>
+          <a:fillRef idx="0">
+            <a:schemeClr val="dk1"/>
+          </a:fillRef>
+          <a:effectRef idx="0">
+            <a:schemeClr val="dk1"/>
+          </a:effectRef>
+          <a:fontRef idx="minor">
+            <a:schemeClr val="tx1"/>
+          </a:fontRef>
+        </p:style>
+      </p:cxnSp>
+      <p:sp>
+        <p:nvSpPr>
+          <p:cNvPr id="135" name="TextBox 134">
+            <a:extLst>
+              <a:ext uri="{FF2B5EF4-FFF2-40B4-BE49-F238E27FC236}">
+                <a16:creationId xmlns:a16="http://schemas.microsoft.com/office/drawing/2014/main" id="{26B6C4D5-BF80-383A-2CD6-DA035C5B9C74}"/>
               </a:ext>
             </a:extLst>
           </p:cNvPr>
@@ -8101,8 +9485,8 @@
         </p:nvSpPr>
         <p:spPr>
           <a:xfrm>
-            <a:off x="4095341" y="6343234"/>
-            <a:ext cx="1788397" cy="369332"/>
+            <a:off x="911234" y="2232555"/>
+            <a:ext cx="1788397" cy="646331"/>
           </a:xfrm>
           <a:prstGeom prst="rect">
             <a:avLst/>
@@ -8125,186 +9509,7 @@
                 <a:latin typeface="맑은 고딕" panose="020B0503020000020004" pitchFamily="50" charset="-127"/>
                 <a:ea typeface="맑은 고딕" panose="020B0503020000020004" pitchFamily="50" charset="-127"/>
               </a:rPr>
-              <a:t>DAT-31A-PP+</a:t>
-            </a:r>
-            <a:r>
-              <a:rPr lang="en-US" altLang="ko-KR"/>
-              <a:t> </a:t>
-            </a:r>
-            <a:endParaRPr lang="ko-KR" altLang="en-US"/>
-          </a:p>
-        </p:txBody>
-      </p:sp>
-      <p:cxnSp>
-        <p:nvCxnSpPr>
-          <p:cNvPr id="86" name="직선 연결선 85">
-            <a:extLst>
-              <a:ext uri="{FF2B5EF4-FFF2-40B4-BE49-F238E27FC236}">
-                <a16:creationId xmlns:a16="http://schemas.microsoft.com/office/drawing/2014/main" id="{D3D93FAB-DC53-BC34-D1CE-5B7B0B80A202}"/>
-              </a:ext>
-            </a:extLst>
-          </p:cNvPr>
-          <p:cNvCxnSpPr>
-            <a:cxnSpLocks/>
-            <a:stCxn id="85" idx="0"/>
-            <a:endCxn id="37" idx="2"/>
-          </p:cNvCxnSpPr>
-          <p:nvPr/>
-        </p:nvCxnSpPr>
-        <p:spPr>
-          <a:xfrm flipV="1">
-            <a:off x="4989540" y="5099419"/>
-            <a:ext cx="1288471" cy="1243815"/>
-          </a:xfrm>
-          <a:prstGeom prst="line">
-            <a:avLst/>
-          </a:prstGeom>
-          <a:ln w="19050">
-            <a:prstDash val="lgDash"/>
-          </a:ln>
-        </p:spPr>
-        <p:style>
-          <a:lnRef idx="1">
-            <a:schemeClr val="dk1"/>
-          </a:lnRef>
-          <a:fillRef idx="0">
-            <a:schemeClr val="dk1"/>
-          </a:fillRef>
-          <a:effectRef idx="0">
-            <a:schemeClr val="dk1"/>
-          </a:effectRef>
-          <a:fontRef idx="minor">
-            <a:schemeClr val="tx1"/>
-          </a:fontRef>
-        </p:style>
-      </p:cxnSp>
-      <p:sp>
-        <p:nvSpPr>
-          <p:cNvPr id="92" name="TextBox 91">
-            <a:extLst>
-              <a:ext uri="{FF2B5EF4-FFF2-40B4-BE49-F238E27FC236}">
-                <a16:creationId xmlns:a16="http://schemas.microsoft.com/office/drawing/2014/main" id="{F2B16B54-45A7-6276-FBAB-FB60ECC4B8FB}"/>
-              </a:ext>
-            </a:extLst>
-          </p:cNvPr>
-          <p:cNvSpPr txBox="1"/>
-          <p:nvPr/>
-        </p:nvSpPr>
-        <p:spPr>
-          <a:xfrm>
-            <a:off x="6375581" y="2669087"/>
-            <a:ext cx="1788397" cy="369332"/>
-          </a:xfrm>
-          <a:prstGeom prst="rect">
-            <a:avLst/>
-          </a:prstGeom>
-          <a:noFill/>
-        </p:spPr>
-        <p:txBody>
-          <a:bodyPr wrap="square">
-            <a:spAutoFit/>
-          </a:bodyPr>
-          <a:lstStyle/>
-          <a:p>
-            <a:pPr algn="ctr"/>
-            <a:r>
-              <a:rPr lang="en-US" altLang="ko-KR" sz="1800" b="0" i="0" u="none" strike="noStrike">
-                <a:solidFill>
-                  <a:srgbClr val="000000"/>
-                </a:solidFill>
-                <a:effectLst/>
-                <a:latin typeface="맑은 고딕" panose="020B0503020000020004" pitchFamily="50" charset="-127"/>
-                <a:ea typeface="맑은 고딕" panose="020B0503020000020004" pitchFamily="50" charset="-127"/>
-              </a:rPr>
-              <a:t>5 digital pins</a:t>
-            </a:r>
-            <a:endParaRPr lang="ko-KR" altLang="en-US"/>
-          </a:p>
-        </p:txBody>
-      </p:sp>
-      <p:sp>
-        <p:nvSpPr>
-          <p:cNvPr id="93" name="TextBox 92">
-            <a:extLst>
-              <a:ext uri="{FF2B5EF4-FFF2-40B4-BE49-F238E27FC236}">
-                <a16:creationId xmlns:a16="http://schemas.microsoft.com/office/drawing/2014/main" id="{5BD01865-6106-1C39-CAD0-3C6D458A52C7}"/>
-              </a:ext>
-            </a:extLst>
-          </p:cNvPr>
-          <p:cNvSpPr txBox="1"/>
-          <p:nvPr/>
-        </p:nvSpPr>
-        <p:spPr>
-          <a:xfrm>
-            <a:off x="4460758" y="2669087"/>
-            <a:ext cx="1788397" cy="369332"/>
-          </a:xfrm>
-          <a:prstGeom prst="rect">
-            <a:avLst/>
-          </a:prstGeom>
-          <a:noFill/>
-        </p:spPr>
-        <p:txBody>
-          <a:bodyPr wrap="square">
-            <a:spAutoFit/>
-          </a:bodyPr>
-          <a:lstStyle/>
-          <a:p>
-            <a:pPr algn="ctr"/>
-            <a:r>
-              <a:rPr lang="en-US" altLang="ko-KR" sz="1800" b="0" i="0" u="none" strike="noStrike">
-                <a:solidFill>
-                  <a:srgbClr val="000000"/>
-                </a:solidFill>
-                <a:effectLst/>
-                <a:latin typeface="맑은 고딕" panose="020B0503020000020004" pitchFamily="50" charset="-127"/>
-                <a:ea typeface="맑은 고딕" panose="020B0503020000020004" pitchFamily="50" charset="-127"/>
-              </a:rPr>
-              <a:t>1 digital pins</a:t>
-            </a:r>
-            <a:endParaRPr lang="ko-KR" altLang="en-US"/>
-          </a:p>
-        </p:txBody>
-      </p:sp>
-      <p:sp>
-        <p:nvSpPr>
-          <p:cNvPr id="97" name="TextBox 96">
-            <a:extLst>
-              <a:ext uri="{FF2B5EF4-FFF2-40B4-BE49-F238E27FC236}">
-                <a16:creationId xmlns:a16="http://schemas.microsoft.com/office/drawing/2014/main" id="{30384885-52E9-B1DA-83C2-4D9AEF36CD1E}"/>
-              </a:ext>
-            </a:extLst>
-          </p:cNvPr>
-          <p:cNvSpPr txBox="1"/>
-          <p:nvPr/>
-        </p:nvSpPr>
-        <p:spPr>
-          <a:xfrm>
-            <a:off x="5836475" y="6431202"/>
-            <a:ext cx="2739153" cy="369332"/>
-          </a:xfrm>
-          <a:prstGeom prst="rect">
-            <a:avLst/>
-          </a:prstGeom>
-          <a:noFill/>
-        </p:spPr>
-        <p:txBody>
-          <a:bodyPr wrap="square">
-            <a:spAutoFit/>
-          </a:bodyPr>
-          <a:lstStyle/>
-          <a:p>
-            <a:pPr algn="ctr"/>
-            <a:r>
-              <a:rPr lang="en-US" altLang="ko-KR" sz="1800" b="0" i="0" u="none" strike="noStrike">
-                <a:solidFill>
-                  <a:srgbClr val="000000"/>
-                </a:solidFill>
-                <a:effectLst/>
-                <a:latin typeface="맑은 고딕" panose="020B0503020000020004" pitchFamily="50" charset="-127"/>
-                <a:ea typeface="맑은 고딕" panose="020B0503020000020004" pitchFamily="50" charset="-127"/>
-              </a:rPr>
-              <a:t>or total 13dB attenuator?</a:t>
+              <a:t>use IO port as a CPLD clock</a:t>
             </a:r>
             <a:endParaRPr lang="ko-KR" altLang="en-US"/>
           </a:p>
@@ -8372,174 +9577,6 @@
       </p:pic>
       <p:sp>
         <p:nvSpPr>
-          <p:cNvPr id="6" name="직사각형 5">
-            <a:extLst>
-              <a:ext uri="{FF2B5EF4-FFF2-40B4-BE49-F238E27FC236}">
-                <a16:creationId xmlns:a16="http://schemas.microsoft.com/office/drawing/2014/main" id="{C5E1EC08-A74C-FB2E-55C5-CDD6C0CAF529}"/>
-              </a:ext>
-            </a:extLst>
-          </p:cNvPr>
-          <p:cNvSpPr/>
-          <p:nvPr/>
-        </p:nvSpPr>
-        <p:spPr>
-          <a:xfrm>
-            <a:off x="2297874" y="5520267"/>
-            <a:ext cx="5149405" cy="322392"/>
-          </a:xfrm>
-          <a:prstGeom prst="rect">
-            <a:avLst/>
-          </a:prstGeom>
-          <a:solidFill>
-            <a:srgbClr val="FF0000">
-              <a:alpha val="37000"/>
-            </a:srgbClr>
-          </a:solidFill>
-          <a:ln w="28575">
-            <a:solidFill>
-              <a:srgbClr val="FF0000"/>
-            </a:solidFill>
-          </a:ln>
-        </p:spPr>
-        <p:style>
-          <a:lnRef idx="2">
-            <a:schemeClr val="accent1">
-              <a:shade val="15000"/>
-            </a:schemeClr>
-          </a:lnRef>
-          <a:fillRef idx="1">
-            <a:schemeClr val="accent1"/>
-          </a:fillRef>
-          <a:effectRef idx="0">
-            <a:schemeClr val="accent1"/>
-          </a:effectRef>
-          <a:fontRef idx="minor">
-            <a:schemeClr val="lt1"/>
-          </a:fontRef>
-        </p:style>
-        <p:txBody>
-          <a:bodyPr rtlCol="0" anchor="ctr"/>
-          <a:lstStyle/>
-          <a:p>
-            <a:pPr algn="ctr"/>
-            <a:endParaRPr lang="ko-KR" altLang="en-US"/>
-          </a:p>
-        </p:txBody>
-      </p:sp>
-      <p:sp>
-        <p:nvSpPr>
-          <p:cNvPr id="9" name="직사각형 8">
-            <a:extLst>
-              <a:ext uri="{FF2B5EF4-FFF2-40B4-BE49-F238E27FC236}">
-                <a16:creationId xmlns:a16="http://schemas.microsoft.com/office/drawing/2014/main" id="{0BC921EA-9830-3E3C-CA59-77445B3ED8AF}"/>
-              </a:ext>
-            </a:extLst>
-          </p:cNvPr>
-          <p:cNvSpPr/>
-          <p:nvPr/>
-        </p:nvSpPr>
-        <p:spPr>
-          <a:xfrm>
-            <a:off x="2297874" y="5841600"/>
-            <a:ext cx="4387405" cy="284033"/>
-          </a:xfrm>
-          <a:prstGeom prst="rect">
-            <a:avLst/>
-          </a:prstGeom>
-          <a:solidFill>
-            <a:srgbClr val="FF0000">
-              <a:alpha val="37000"/>
-            </a:srgbClr>
-          </a:solidFill>
-          <a:ln w="28575">
-            <a:solidFill>
-              <a:srgbClr val="FF0000"/>
-            </a:solidFill>
-          </a:ln>
-        </p:spPr>
-        <p:style>
-          <a:lnRef idx="2">
-            <a:schemeClr val="accent1">
-              <a:shade val="15000"/>
-            </a:schemeClr>
-          </a:lnRef>
-          <a:fillRef idx="1">
-            <a:schemeClr val="accent1"/>
-          </a:fillRef>
-          <a:effectRef idx="0">
-            <a:schemeClr val="accent1"/>
-          </a:effectRef>
-          <a:fontRef idx="minor">
-            <a:schemeClr val="lt1"/>
-          </a:fontRef>
-        </p:style>
-        <p:txBody>
-          <a:bodyPr rtlCol="0" anchor="ctr"/>
-          <a:lstStyle/>
-          <a:p>
-            <a:pPr algn="ctr"/>
-            <a:endParaRPr lang="ko-KR" altLang="en-US"/>
-          </a:p>
-        </p:txBody>
-      </p:sp>
-      <p:sp>
-        <p:nvSpPr>
-          <p:cNvPr id="12" name="직사각형 11">
-            <a:extLst>
-              <a:ext uri="{FF2B5EF4-FFF2-40B4-BE49-F238E27FC236}">
-                <a16:creationId xmlns:a16="http://schemas.microsoft.com/office/drawing/2014/main" id="{C68CD428-9AD6-7349-BA85-845057196DD9}"/>
-              </a:ext>
-            </a:extLst>
-          </p:cNvPr>
-          <p:cNvSpPr/>
-          <p:nvPr/>
-        </p:nvSpPr>
-        <p:spPr>
-          <a:xfrm>
-            <a:off x="2297875" y="6125633"/>
-            <a:ext cx="4387404" cy="322392"/>
-          </a:xfrm>
-          <a:prstGeom prst="rect">
-            <a:avLst/>
-          </a:prstGeom>
-          <a:solidFill>
-            <a:srgbClr val="FF0000">
-              <a:alpha val="37000"/>
-            </a:srgbClr>
-          </a:solidFill>
-          <a:ln w="28575">
-            <a:solidFill>
-              <a:srgbClr val="FF0000"/>
-            </a:solidFill>
-          </a:ln>
-        </p:spPr>
-        <p:style>
-          <a:lnRef idx="2">
-            <a:schemeClr val="accent1">
-              <a:shade val="15000"/>
-            </a:schemeClr>
-          </a:lnRef>
-          <a:fillRef idx="1">
-            <a:schemeClr val="accent1"/>
-          </a:fillRef>
-          <a:effectRef idx="0">
-            <a:schemeClr val="accent1"/>
-          </a:effectRef>
-          <a:fontRef idx="minor">
-            <a:schemeClr val="lt1"/>
-          </a:fontRef>
-        </p:style>
-        <p:txBody>
-          <a:bodyPr rtlCol="0" anchor="ctr"/>
-          <a:lstStyle/>
-          <a:p>
-            <a:pPr algn="ctr"/>
-            <a:endParaRPr lang="ko-KR" altLang="en-US"/>
-          </a:p>
-        </p:txBody>
-      </p:sp>
-      <p:sp>
-        <p:nvSpPr>
           <p:cNvPr id="14" name="TextBox 13">
             <a:extLst>
               <a:ext uri="{FF2B5EF4-FFF2-40B4-BE49-F238E27FC236}">
@@ -8578,62 +9615,6 @@
               </a:rPr>
               <a:t>8ns resolution</a:t>
             </a:r>
-            <a:endParaRPr lang="ko-KR" altLang="en-US"/>
-          </a:p>
-        </p:txBody>
-      </p:sp>
-      <p:sp>
-        <p:nvSpPr>
-          <p:cNvPr id="15" name="직사각형 14">
-            <a:extLst>
-              <a:ext uri="{FF2B5EF4-FFF2-40B4-BE49-F238E27FC236}">
-                <a16:creationId xmlns:a16="http://schemas.microsoft.com/office/drawing/2014/main" id="{5C21470F-A224-7A6B-A00D-C64C09AC5C21}"/>
-              </a:ext>
-            </a:extLst>
-          </p:cNvPr>
-          <p:cNvSpPr/>
-          <p:nvPr/>
-        </p:nvSpPr>
-        <p:spPr>
-          <a:xfrm>
-            <a:off x="6685279" y="5841600"/>
-            <a:ext cx="1524000" cy="606425"/>
-          </a:xfrm>
-          <a:prstGeom prst="rect">
-            <a:avLst/>
-          </a:prstGeom>
-          <a:solidFill>
-            <a:srgbClr val="FF0000">
-              <a:alpha val="37000"/>
-            </a:srgbClr>
-          </a:solidFill>
-          <a:ln w="28575">
-            <a:solidFill>
-              <a:srgbClr val="FF0000"/>
-            </a:solidFill>
-          </a:ln>
-        </p:spPr>
-        <p:style>
-          <a:lnRef idx="2">
-            <a:schemeClr val="accent1">
-              <a:shade val="15000"/>
-            </a:schemeClr>
-          </a:lnRef>
-          <a:fillRef idx="1">
-            <a:schemeClr val="accent1"/>
-          </a:fillRef>
-          <a:effectRef idx="0">
-            <a:schemeClr val="accent1"/>
-          </a:effectRef>
-          <a:fontRef idx="minor">
-            <a:schemeClr val="lt1"/>
-          </a:fontRef>
-        </p:style>
-        <p:txBody>
-          <a:bodyPr rtlCol="0" anchor="ctr"/>
-          <a:lstStyle/>
-          <a:p>
-            <a:pPr algn="ctr"/>
             <a:endParaRPr lang="ko-KR" altLang="en-US"/>
           </a:p>
         </p:txBody>
@@ -8698,230 +9679,6 @@
           </a:prstGeom>
         </p:spPr>
       </p:pic>
-      <p:sp>
-        <p:nvSpPr>
-          <p:cNvPr id="6" name="직사각형 5">
-            <a:extLst>
-              <a:ext uri="{FF2B5EF4-FFF2-40B4-BE49-F238E27FC236}">
-                <a16:creationId xmlns:a16="http://schemas.microsoft.com/office/drawing/2014/main" id="{F2338533-4B89-9515-2C6C-4A1422B05A4E}"/>
-              </a:ext>
-            </a:extLst>
-          </p:cNvPr>
-          <p:cNvSpPr/>
-          <p:nvPr/>
-        </p:nvSpPr>
-        <p:spPr>
-          <a:xfrm>
-            <a:off x="3275774" y="440267"/>
-            <a:ext cx="4248975" cy="322392"/>
-          </a:xfrm>
-          <a:prstGeom prst="rect">
-            <a:avLst/>
-          </a:prstGeom>
-          <a:solidFill>
-            <a:srgbClr val="FF0000">
-              <a:alpha val="37000"/>
-            </a:srgbClr>
-          </a:solidFill>
-          <a:ln w="28575">
-            <a:solidFill>
-              <a:srgbClr val="FF0000"/>
-            </a:solidFill>
-          </a:ln>
-        </p:spPr>
-        <p:style>
-          <a:lnRef idx="2">
-            <a:schemeClr val="accent1">
-              <a:shade val="15000"/>
-            </a:schemeClr>
-          </a:lnRef>
-          <a:fillRef idx="1">
-            <a:schemeClr val="accent1"/>
-          </a:fillRef>
-          <a:effectRef idx="0">
-            <a:schemeClr val="accent1"/>
-          </a:effectRef>
-          <a:fontRef idx="minor">
-            <a:schemeClr val="lt1"/>
-          </a:fontRef>
-        </p:style>
-        <p:txBody>
-          <a:bodyPr rtlCol="0" anchor="ctr"/>
-          <a:lstStyle/>
-          <a:p>
-            <a:pPr algn="ctr"/>
-            <a:endParaRPr lang="ko-KR" altLang="en-US"/>
-          </a:p>
-        </p:txBody>
-      </p:sp>
-      <p:sp>
-        <p:nvSpPr>
-          <p:cNvPr id="7" name="직사각형 6">
-            <a:extLst>
-              <a:ext uri="{FF2B5EF4-FFF2-40B4-BE49-F238E27FC236}">
-                <a16:creationId xmlns:a16="http://schemas.microsoft.com/office/drawing/2014/main" id="{2FAAEB34-9B48-E179-0EFE-E1F7E8047D7A}"/>
-              </a:ext>
-            </a:extLst>
-          </p:cNvPr>
-          <p:cNvSpPr/>
-          <p:nvPr/>
-        </p:nvSpPr>
-        <p:spPr>
-          <a:xfrm>
-            <a:off x="3275774" y="761600"/>
-            <a:ext cx="4248975" cy="284033"/>
-          </a:xfrm>
-          <a:prstGeom prst="rect">
-            <a:avLst/>
-          </a:prstGeom>
-          <a:solidFill>
-            <a:srgbClr val="FF0000">
-              <a:alpha val="37000"/>
-            </a:srgbClr>
-          </a:solidFill>
-          <a:ln w="28575">
-            <a:solidFill>
-              <a:srgbClr val="FF0000"/>
-            </a:solidFill>
-          </a:ln>
-        </p:spPr>
-        <p:style>
-          <a:lnRef idx="2">
-            <a:schemeClr val="accent1">
-              <a:shade val="15000"/>
-            </a:schemeClr>
-          </a:lnRef>
-          <a:fillRef idx="1">
-            <a:schemeClr val="accent1"/>
-          </a:fillRef>
-          <a:effectRef idx="0">
-            <a:schemeClr val="accent1"/>
-          </a:effectRef>
-          <a:fontRef idx="minor">
-            <a:schemeClr val="lt1"/>
-          </a:fontRef>
-        </p:style>
-        <p:txBody>
-          <a:bodyPr rtlCol="0" anchor="ctr"/>
-          <a:lstStyle/>
-          <a:p>
-            <a:pPr algn="ctr"/>
-            <a:endParaRPr lang="ko-KR" altLang="en-US"/>
-          </a:p>
-        </p:txBody>
-      </p:sp>
-      <p:sp>
-        <p:nvSpPr>
-          <p:cNvPr id="8" name="직사각형 7">
-            <a:extLst>
-              <a:ext uri="{FF2B5EF4-FFF2-40B4-BE49-F238E27FC236}">
-                <a16:creationId xmlns:a16="http://schemas.microsoft.com/office/drawing/2014/main" id="{5557258B-032D-3447-7DAF-D6B8EA5184D6}"/>
-              </a:ext>
-            </a:extLst>
-          </p:cNvPr>
-          <p:cNvSpPr/>
-          <p:nvPr/>
-        </p:nvSpPr>
-        <p:spPr>
-          <a:xfrm>
-            <a:off x="3275774" y="1045633"/>
-            <a:ext cx="5030026" cy="322392"/>
-          </a:xfrm>
-          <a:prstGeom prst="rect">
-            <a:avLst/>
-          </a:prstGeom>
-          <a:solidFill>
-            <a:srgbClr val="FF0000">
-              <a:alpha val="37000"/>
-            </a:srgbClr>
-          </a:solidFill>
-          <a:ln w="28575">
-            <a:solidFill>
-              <a:srgbClr val="FF0000"/>
-            </a:solidFill>
-          </a:ln>
-        </p:spPr>
-        <p:style>
-          <a:lnRef idx="2">
-            <a:schemeClr val="accent1">
-              <a:shade val="15000"/>
-            </a:schemeClr>
-          </a:lnRef>
-          <a:fillRef idx="1">
-            <a:schemeClr val="accent1"/>
-          </a:fillRef>
-          <a:effectRef idx="0">
-            <a:schemeClr val="accent1"/>
-          </a:effectRef>
-          <a:fontRef idx="minor">
-            <a:schemeClr val="lt1"/>
-          </a:fontRef>
-        </p:style>
-        <p:txBody>
-          <a:bodyPr rtlCol="0" anchor="ctr"/>
-          <a:lstStyle/>
-          <a:p>
-            <a:pPr algn="ctr"/>
-            <a:endParaRPr lang="ko-KR" altLang="en-US"/>
-          </a:p>
-        </p:txBody>
-      </p:sp>
-      <p:sp>
-        <p:nvSpPr>
-          <p:cNvPr id="10" name="직사각형 9">
-            <a:extLst>
-              <a:ext uri="{FF2B5EF4-FFF2-40B4-BE49-F238E27FC236}">
-                <a16:creationId xmlns:a16="http://schemas.microsoft.com/office/drawing/2014/main" id="{76E93F26-4EB2-4886-255B-F5A9E26E7D32}"/>
-              </a:ext>
-            </a:extLst>
-          </p:cNvPr>
-          <p:cNvSpPr/>
-          <p:nvPr/>
-        </p:nvSpPr>
-        <p:spPr>
-          <a:xfrm>
-            <a:off x="7524749" y="440267"/>
-            <a:ext cx="1539240" cy="322392"/>
-          </a:xfrm>
-          <a:prstGeom prst="rect">
-            <a:avLst/>
-          </a:prstGeom>
-          <a:solidFill>
-            <a:srgbClr val="FF0000">
-              <a:alpha val="37000"/>
-            </a:srgbClr>
-          </a:solidFill>
-          <a:ln w="28575">
-            <a:solidFill>
-              <a:srgbClr val="FF0000"/>
-            </a:solidFill>
-          </a:ln>
-        </p:spPr>
-        <p:style>
-          <a:lnRef idx="2">
-            <a:schemeClr val="accent1">
-              <a:shade val="15000"/>
-            </a:schemeClr>
-          </a:lnRef>
-          <a:fillRef idx="1">
-            <a:schemeClr val="accent1"/>
-          </a:fillRef>
-          <a:effectRef idx="0">
-            <a:schemeClr val="accent1"/>
-          </a:effectRef>
-          <a:fontRef idx="minor">
-            <a:schemeClr val="lt1"/>
-          </a:fontRef>
-        </p:style>
-        <p:txBody>
-          <a:bodyPr rtlCol="0" anchor="ctr"/>
-          <a:lstStyle/>
-          <a:p>
-            <a:pPr algn="ctr"/>
-            <a:endParaRPr lang="ko-KR" altLang="en-US"/>
-          </a:p>
-        </p:txBody>
-      </p:sp>
     </p:spTree>
     <p:extLst>
       <p:ext uri="{BB962C8B-B14F-4D97-AF65-F5344CB8AC3E}">

</xml_diff>

<commit_message>
Filter is chosen to butterworth filter, since second chebysev filter cannot be implemented in lumped element circuit
</commit_message>
<xml_diff>
--- a/Documents/PPT/RFSoC RF FrontEnd_v1_00.pptx
+++ b/Documents/PPT/RFSoC RF FrontEnd_v1_00.pptx
@@ -273,7 +273,7 @@
           <a:p>
             <a:fld id="{83D81050-B5AC-4287-9BFE-8FA365E2B7CE}" type="datetimeFigureOut">
               <a:rPr lang="ko-KR" altLang="en-US" smtClean="0"/>
-              <a:t>2023-11-30</a:t>
+              <a:t>2023-12-01</a:t>
             </a:fld>
             <a:endParaRPr lang="ko-KR" altLang="en-US"/>
           </a:p>
@@ -471,7 +471,7 @@
           <a:p>
             <a:fld id="{83D81050-B5AC-4287-9BFE-8FA365E2B7CE}" type="datetimeFigureOut">
               <a:rPr lang="ko-KR" altLang="en-US" smtClean="0"/>
-              <a:t>2023-11-30</a:t>
+              <a:t>2023-12-01</a:t>
             </a:fld>
             <a:endParaRPr lang="ko-KR" altLang="en-US"/>
           </a:p>
@@ -679,7 +679,7 @@
           <a:p>
             <a:fld id="{83D81050-B5AC-4287-9BFE-8FA365E2B7CE}" type="datetimeFigureOut">
               <a:rPr lang="ko-KR" altLang="en-US" smtClean="0"/>
-              <a:t>2023-11-30</a:t>
+              <a:t>2023-12-01</a:t>
             </a:fld>
             <a:endParaRPr lang="ko-KR" altLang="en-US"/>
           </a:p>
@@ -877,7 +877,7 @@
           <a:p>
             <a:fld id="{83D81050-B5AC-4287-9BFE-8FA365E2B7CE}" type="datetimeFigureOut">
               <a:rPr lang="ko-KR" altLang="en-US" smtClean="0"/>
-              <a:t>2023-11-30</a:t>
+              <a:t>2023-12-01</a:t>
             </a:fld>
             <a:endParaRPr lang="ko-KR" altLang="en-US"/>
           </a:p>
@@ -1152,7 +1152,7 @@
           <a:p>
             <a:fld id="{83D81050-B5AC-4287-9BFE-8FA365E2B7CE}" type="datetimeFigureOut">
               <a:rPr lang="ko-KR" altLang="en-US" smtClean="0"/>
-              <a:t>2023-11-30</a:t>
+              <a:t>2023-12-01</a:t>
             </a:fld>
             <a:endParaRPr lang="ko-KR" altLang="en-US"/>
           </a:p>
@@ -1417,7 +1417,7 @@
           <a:p>
             <a:fld id="{83D81050-B5AC-4287-9BFE-8FA365E2B7CE}" type="datetimeFigureOut">
               <a:rPr lang="ko-KR" altLang="en-US" smtClean="0"/>
-              <a:t>2023-11-30</a:t>
+              <a:t>2023-12-01</a:t>
             </a:fld>
             <a:endParaRPr lang="ko-KR" altLang="en-US"/>
           </a:p>
@@ -1829,7 +1829,7 @@
           <a:p>
             <a:fld id="{83D81050-B5AC-4287-9BFE-8FA365E2B7CE}" type="datetimeFigureOut">
               <a:rPr lang="ko-KR" altLang="en-US" smtClean="0"/>
-              <a:t>2023-11-30</a:t>
+              <a:t>2023-12-01</a:t>
             </a:fld>
             <a:endParaRPr lang="ko-KR" altLang="en-US"/>
           </a:p>
@@ -1970,7 +1970,7 @@
           <a:p>
             <a:fld id="{83D81050-B5AC-4287-9BFE-8FA365E2B7CE}" type="datetimeFigureOut">
               <a:rPr lang="ko-KR" altLang="en-US" smtClean="0"/>
-              <a:t>2023-11-30</a:t>
+              <a:t>2023-12-01</a:t>
             </a:fld>
             <a:endParaRPr lang="ko-KR" altLang="en-US"/>
           </a:p>
@@ -2083,7 +2083,7 @@
           <a:p>
             <a:fld id="{83D81050-B5AC-4287-9BFE-8FA365E2B7CE}" type="datetimeFigureOut">
               <a:rPr lang="ko-KR" altLang="en-US" smtClean="0"/>
-              <a:t>2023-11-30</a:t>
+              <a:t>2023-12-01</a:t>
             </a:fld>
             <a:endParaRPr lang="ko-KR" altLang="en-US"/>
           </a:p>
@@ -2394,7 +2394,7 @@
           <a:p>
             <a:fld id="{83D81050-B5AC-4287-9BFE-8FA365E2B7CE}" type="datetimeFigureOut">
               <a:rPr lang="ko-KR" altLang="en-US" smtClean="0"/>
-              <a:t>2023-11-30</a:t>
+              <a:t>2023-12-01</a:t>
             </a:fld>
             <a:endParaRPr lang="ko-KR" altLang="en-US"/>
           </a:p>
@@ -2682,7 +2682,7 @@
           <a:p>
             <a:fld id="{83D81050-B5AC-4287-9BFE-8FA365E2B7CE}" type="datetimeFigureOut">
               <a:rPr lang="ko-KR" altLang="en-US" smtClean="0"/>
-              <a:t>2023-11-30</a:t>
+              <a:t>2023-12-01</a:t>
             </a:fld>
             <a:endParaRPr lang="ko-KR" altLang="en-US"/>
           </a:p>
@@ -2923,7 +2923,7 @@
           <a:p>
             <a:fld id="{83D81050-B5AC-4287-9BFE-8FA365E2B7CE}" type="datetimeFigureOut">
               <a:rPr lang="ko-KR" altLang="en-US" smtClean="0"/>
-              <a:t>2023-11-30</a:t>
+              <a:t>2023-12-01</a:t>
             </a:fld>
             <a:endParaRPr lang="ko-KR" altLang="en-US"/>
           </a:p>
@@ -14333,7 +14333,7 @@
         <p:spPr>
           <a:xfrm>
             <a:off x="6271277" y="2204539"/>
-            <a:ext cx="1748783" cy="646331"/>
+            <a:ext cx="1748783" cy="923330"/>
           </a:xfrm>
           <a:prstGeom prst="rect">
             <a:avLst/>
@@ -14356,6 +14356,15 @@
                 <a:effectLst/>
               </a:rPr>
               <a:t> filter</a:t>
+            </a:r>
+          </a:p>
+          <a:p>
+            <a:pPr algn="ctr"/>
+            <a:r>
+              <a:rPr lang="en-US" altLang="ko-KR" sz="1800" i="0">
+                <a:effectLst/>
+              </a:rPr>
+              <a:t>-&gt;Butterworth</a:t>
             </a:r>
             <a:endParaRPr lang="ko-KR" altLang="en-US"/>
           </a:p>
@@ -14379,8 +14388,8 @@
         </p:nvCxnSpPr>
         <p:spPr>
           <a:xfrm flipV="1">
-            <a:off x="6761353" y="2850870"/>
-            <a:ext cx="384316" cy="1122028"/>
+            <a:off x="6761353" y="3127869"/>
+            <a:ext cx="384316" cy="845029"/>
           </a:xfrm>
           <a:prstGeom prst="line">
             <a:avLst/>

</xml_diff>